<commit_message>
JWT Web Api & Client Demo in Word File
</commit_message>
<xml_diff>
--- a/24thMay/Unit Testing.pptx
+++ b/24thMay/Unit Testing.pptx
@@ -5,7 +5,7 @@
     <p:sldMasterId id="2147483734" r:id="rId1"/>
   </p:sldMasterIdLst>
   <p:notesMasterIdLst>
-    <p:notesMasterId r:id="rId25"/>
+    <p:notesMasterId r:id="rId21"/>
   </p:notesMasterIdLst>
   <p:sldIdLst>
     <p:sldId id="326" r:id="rId2"/>
@@ -23,14 +23,10 @@
     <p:sldId id="312" r:id="rId14"/>
     <p:sldId id="313" r:id="rId15"/>
     <p:sldId id="314" r:id="rId16"/>
-    <p:sldId id="317" r:id="rId17"/>
-    <p:sldId id="315" r:id="rId18"/>
-    <p:sldId id="316" r:id="rId19"/>
-    <p:sldId id="319" r:id="rId20"/>
-    <p:sldId id="318" r:id="rId21"/>
-    <p:sldId id="320" r:id="rId22"/>
-    <p:sldId id="321" r:id="rId23"/>
-    <p:sldId id="301" r:id="rId24"/>
+    <p:sldId id="315" r:id="rId17"/>
+    <p:sldId id="316" r:id="rId18"/>
+    <p:sldId id="318" r:id="rId19"/>
+    <p:sldId id="301" r:id="rId20"/>
   </p:sldIdLst>
   <p:sldSz cx="12192000" cy="6858000"/>
   <p:notesSz cx="6858000" cy="9144000"/>
@@ -131,7 +127,7 @@
   </p:defaultTextStyle>
   <p:extLst>
     <p:ext uri="{EFAFB233-063F-42B5-8137-9DF3F51BA10A}">
-      <p15:sldGuideLst xmlns="" xmlns:p15="http://schemas.microsoft.com/office/powerpoint/2012/main">
+      <p15:sldGuideLst xmlns:p15="http://schemas.microsoft.com/office/powerpoint/2012/main" xmlns="">
         <p15:guide id="1" orient="horz" pos="552" userDrawn="1">
           <p15:clr>
             <a:srgbClr val="A4A3A4"/>
@@ -255,7 +251,7 @@
           <a:p>
             <a:fld id="{63D5E741-A0E7-F84B-81AF-B68C59C51525}" type="datetimeFigureOut">
               <a:rPr lang="en-US" smtClean="0"/>
-              <a:t>4/12/2021</a:t>
+              <a:t>7/18/2021</a:t>
             </a:fld>
             <a:endParaRPr lang="en-US"/>
           </a:p>
@@ -606,354 +602,6 @@
 </p:notes>
 </file>
 
-<file path=ppt/notesSlides/notesSlide10.xml><?xml version="1.0" encoding="utf-8"?>
-<p:notes xmlns:a="http://schemas.openxmlformats.org/drawingml/2006/main" xmlns:r="http://schemas.openxmlformats.org/officeDocument/2006/relationships" xmlns:p="http://schemas.openxmlformats.org/presentationml/2006/main">
-  <p:cSld>
-    <p:spTree>
-      <p:nvGrpSpPr>
-        <p:cNvPr id="1" name=""/>
-        <p:cNvGrpSpPr/>
-        <p:nvPr/>
-      </p:nvGrpSpPr>
-      <p:grpSpPr>
-        <a:xfrm>
-          <a:off x="0" y="0"/>
-          <a:ext cx="0" cy="0"/>
-          <a:chOff x="0" y="0"/>
-          <a:chExt cx="0" cy="0"/>
-        </a:xfrm>
-      </p:grpSpPr>
-      <p:sp>
-        <p:nvSpPr>
-          <p:cNvPr id="2" name="Slide Image Placeholder 1"/>
-          <p:cNvSpPr>
-            <a:spLocks noGrp="1" noRot="1" noChangeAspect="1"/>
-          </p:cNvSpPr>
-          <p:nvPr>
-            <p:ph type="sldImg"/>
-          </p:nvPr>
-        </p:nvSpPr>
-        <p:spPr/>
-      </p:sp>
-      <p:sp>
-        <p:nvSpPr>
-          <p:cNvPr id="3" name="Notes Placeholder 2"/>
-          <p:cNvSpPr>
-            <a:spLocks noGrp="1"/>
-          </p:cNvSpPr>
-          <p:nvPr>
-            <p:ph type="body" idx="1"/>
-          </p:nvPr>
-        </p:nvSpPr>
-        <p:spPr/>
-        <p:txBody>
-          <a:bodyPr/>
-          <a:lstStyle/>
-          <a:p>
-            <a:r>
-              <a:rPr lang="en-US" sz="1200" b="0" i="0" u="sng" strike="noStrike" kern="1200" dirty="0" smtClean="0">
-                <a:solidFill>
-                  <a:schemeClr val="tx1"/>
-                </a:solidFill>
-                <a:effectLst/>
-                <a:latin typeface="+mn-lt"/>
-                <a:ea typeface="+mn-ea"/>
-                <a:cs typeface="+mn-cs"/>
-              </a:rPr>
-              <a:t>https://github.com/nuni</a:t>
-            </a:r>
-          </a:p>
-          <a:p>
-            <a:r>
-              <a:rPr lang="en-US" sz="1200" b="0" i="0" u="sng" strike="noStrike" kern="1200" dirty="0" smtClean="0">
-                <a:solidFill>
-                  <a:schemeClr val="tx1"/>
-                </a:solidFill>
-                <a:effectLst/>
-                <a:latin typeface="+mn-lt"/>
-                <a:ea typeface="+mn-ea"/>
-                <a:cs typeface="+mn-cs"/>
-              </a:rPr>
-              <a:t>https://github.com/nunit/docs/wiki/NUnit-Documentation</a:t>
-            </a:r>
-          </a:p>
-          <a:p>
-            <a:pPr marL="0" marR="0" indent="0" algn="l" defTabSz="914400" rtl="0" eaLnBrk="1" fontAlgn="auto" latinLnBrk="0" hangingPunct="1">
-              <a:lnSpc>
-                <a:spcPct val="100000"/>
-              </a:lnSpc>
-              <a:spcBef>
-                <a:spcPts val="0"/>
-              </a:spcBef>
-              <a:spcAft>
-                <a:spcPts val="0"/>
-              </a:spcAft>
-              <a:buClrTx/>
-              <a:buSzTx/>
-              <a:buFontTx/>
-              <a:buNone/>
-              <a:tabLst/>
-              <a:defRPr/>
-            </a:pPr>
-            <a:r>
-              <a:rPr lang="en-US" dirty="0" smtClean="0"/>
-              <a:t>https://github.com/nunit/nunit-csharp-samples</a:t>
-            </a:r>
-          </a:p>
-          <a:p>
-            <a:pPr marL="0" marR="0" indent="0" algn="l" defTabSz="914400" rtl="0" eaLnBrk="1" fontAlgn="auto" latinLnBrk="0" hangingPunct="1">
-              <a:lnSpc>
-                <a:spcPct val="100000"/>
-              </a:lnSpc>
-              <a:spcBef>
-                <a:spcPts val="0"/>
-              </a:spcBef>
-              <a:spcAft>
-                <a:spcPts val="0"/>
-              </a:spcAft>
-              <a:buClrTx/>
-              <a:buSzTx/>
-              <a:buFontTx/>
-              <a:buNone/>
-              <a:tabLst/>
-              <a:defRPr/>
-            </a:pPr>
-            <a:endParaRPr lang="en-US" dirty="0" smtClean="0"/>
-          </a:p>
-          <a:p>
-            <a:endParaRPr lang="en-US" sz="1200" b="0" i="0" u="sng" strike="noStrike" kern="1200" dirty="0" smtClean="0">
-              <a:solidFill>
-                <a:schemeClr val="tx1"/>
-              </a:solidFill>
-              <a:effectLst/>
-              <a:latin typeface="+mn-lt"/>
-              <a:ea typeface="+mn-ea"/>
-              <a:cs typeface="+mn-cs"/>
-            </a:endParaRPr>
-          </a:p>
-          <a:p>
-            <a:endParaRPr lang="en-US" sz="1200" b="0" i="0" u="sng" strike="noStrike" kern="1200" dirty="0" smtClean="0">
-              <a:solidFill>
-                <a:schemeClr val="tx1"/>
-              </a:solidFill>
-              <a:effectLst/>
-              <a:latin typeface="+mn-lt"/>
-              <a:ea typeface="+mn-ea"/>
-              <a:cs typeface="+mn-cs"/>
-            </a:endParaRPr>
-          </a:p>
-        </p:txBody>
-      </p:sp>
-      <p:sp>
-        <p:nvSpPr>
-          <p:cNvPr id="4" name="Slide Number Placeholder 3"/>
-          <p:cNvSpPr>
-            <a:spLocks noGrp="1"/>
-          </p:cNvSpPr>
-          <p:nvPr>
-            <p:ph type="sldNum" sz="quarter" idx="10"/>
-          </p:nvPr>
-        </p:nvSpPr>
-        <p:spPr/>
-        <p:txBody>
-          <a:bodyPr/>
-          <a:lstStyle/>
-          <a:p>
-            <a:fld id="{B0A993B9-56DC-C540-A130-066E4EB4DFC7}" type="slidenum">
-              <a:rPr lang="en-US" smtClean="0"/>
-              <a:t>21</a:t>
-            </a:fld>
-            <a:endParaRPr lang="en-US"/>
-          </a:p>
-        </p:txBody>
-      </p:sp>
-    </p:spTree>
-    <p:extLst>
-      <p:ext uri="{BB962C8B-B14F-4D97-AF65-F5344CB8AC3E}">
-        <p14:creationId xmlns:p14="http://schemas.microsoft.com/office/powerpoint/2010/main" val="3011049496"/>
-      </p:ext>
-    </p:extLst>
-  </p:cSld>
-  <p:clrMapOvr>
-    <a:masterClrMapping/>
-  </p:clrMapOvr>
-</p:notes>
-</file>
-
-<file path=ppt/notesSlides/notesSlide11.xml><?xml version="1.0" encoding="utf-8"?>
-<p:notes xmlns:a="http://schemas.openxmlformats.org/drawingml/2006/main" xmlns:r="http://schemas.openxmlformats.org/officeDocument/2006/relationships" xmlns:p="http://schemas.openxmlformats.org/presentationml/2006/main">
-  <p:cSld>
-    <p:spTree>
-      <p:nvGrpSpPr>
-        <p:cNvPr id="1" name=""/>
-        <p:cNvGrpSpPr/>
-        <p:nvPr/>
-      </p:nvGrpSpPr>
-      <p:grpSpPr>
-        <a:xfrm>
-          <a:off x="0" y="0"/>
-          <a:ext cx="0" cy="0"/>
-          <a:chOff x="0" y="0"/>
-          <a:chExt cx="0" cy="0"/>
-        </a:xfrm>
-      </p:grpSpPr>
-      <p:sp>
-        <p:nvSpPr>
-          <p:cNvPr id="2" name="Slide Image Placeholder 1"/>
-          <p:cNvSpPr>
-            <a:spLocks noGrp="1" noRot="1" noChangeAspect="1"/>
-          </p:cNvSpPr>
-          <p:nvPr>
-            <p:ph type="sldImg"/>
-          </p:nvPr>
-        </p:nvSpPr>
-        <p:spPr/>
-      </p:sp>
-      <p:sp>
-        <p:nvSpPr>
-          <p:cNvPr id="3" name="Notes Placeholder 2"/>
-          <p:cNvSpPr>
-            <a:spLocks noGrp="1"/>
-          </p:cNvSpPr>
-          <p:nvPr>
-            <p:ph type="body" idx="1"/>
-          </p:nvPr>
-        </p:nvSpPr>
-        <p:spPr/>
-        <p:txBody>
-          <a:bodyPr/>
-          <a:lstStyle/>
-          <a:p>
-            <a:r>
-              <a:rPr lang="en-US" sz="1200" b="0" i="0" u="sng" strike="noStrike" kern="1200" dirty="0" smtClean="0">
-                <a:solidFill>
-                  <a:schemeClr val="tx1"/>
-                </a:solidFill>
-                <a:effectLst/>
-                <a:latin typeface="+mn-lt"/>
-                <a:ea typeface="+mn-ea"/>
-                <a:cs typeface="+mn-cs"/>
-              </a:rPr>
-              <a:t>https://github.com/nuni</a:t>
-            </a:r>
-          </a:p>
-          <a:p>
-            <a:r>
-              <a:rPr lang="en-US" sz="1200" b="0" i="0" u="sng" strike="noStrike" kern="1200" dirty="0" smtClean="0">
-                <a:solidFill>
-                  <a:schemeClr val="tx1"/>
-                </a:solidFill>
-                <a:effectLst/>
-                <a:latin typeface="+mn-lt"/>
-                <a:ea typeface="+mn-ea"/>
-                <a:cs typeface="+mn-cs"/>
-              </a:rPr>
-              <a:t>https://github.com/nunit/docs/wiki/NUnit-Documentation</a:t>
-            </a:r>
-          </a:p>
-          <a:p>
-            <a:pPr marL="0" marR="0" indent="0" algn="l" defTabSz="914400" rtl="0" eaLnBrk="1" fontAlgn="auto" latinLnBrk="0" hangingPunct="1">
-              <a:lnSpc>
-                <a:spcPct val="100000"/>
-              </a:lnSpc>
-              <a:spcBef>
-                <a:spcPts val="0"/>
-              </a:spcBef>
-              <a:spcAft>
-                <a:spcPts val="0"/>
-              </a:spcAft>
-              <a:buClrTx/>
-              <a:buSzTx/>
-              <a:buFontTx/>
-              <a:buNone/>
-              <a:tabLst/>
-              <a:defRPr/>
-            </a:pPr>
-            <a:r>
-              <a:rPr lang="en-US" dirty="0" smtClean="0"/>
-              <a:t>https://github.com/nunit/nunit-csharp-samples</a:t>
-            </a:r>
-          </a:p>
-          <a:p>
-            <a:pPr marL="0" marR="0" indent="0" algn="l" defTabSz="914400" rtl="0" eaLnBrk="1" fontAlgn="auto" latinLnBrk="0" hangingPunct="1">
-              <a:lnSpc>
-                <a:spcPct val="100000"/>
-              </a:lnSpc>
-              <a:spcBef>
-                <a:spcPts val="0"/>
-              </a:spcBef>
-              <a:spcAft>
-                <a:spcPts val="0"/>
-              </a:spcAft>
-              <a:buClrTx/>
-              <a:buSzTx/>
-              <a:buFontTx/>
-              <a:buNone/>
-              <a:tabLst/>
-              <a:defRPr/>
-            </a:pPr>
-            <a:endParaRPr lang="en-US" dirty="0" smtClean="0"/>
-          </a:p>
-          <a:p>
-            <a:endParaRPr lang="en-US" sz="1200" b="0" i="0" u="sng" strike="noStrike" kern="1200" dirty="0" smtClean="0">
-              <a:solidFill>
-                <a:schemeClr val="tx1"/>
-              </a:solidFill>
-              <a:effectLst/>
-              <a:latin typeface="+mn-lt"/>
-              <a:ea typeface="+mn-ea"/>
-              <a:cs typeface="+mn-cs"/>
-            </a:endParaRPr>
-          </a:p>
-          <a:p>
-            <a:endParaRPr lang="en-US" sz="1200" b="0" i="0" u="sng" strike="noStrike" kern="1200" dirty="0" smtClean="0">
-              <a:solidFill>
-                <a:schemeClr val="tx1"/>
-              </a:solidFill>
-              <a:effectLst/>
-              <a:latin typeface="+mn-lt"/>
-              <a:ea typeface="+mn-ea"/>
-              <a:cs typeface="+mn-cs"/>
-            </a:endParaRPr>
-          </a:p>
-        </p:txBody>
-      </p:sp>
-      <p:sp>
-        <p:nvSpPr>
-          <p:cNvPr id="4" name="Slide Number Placeholder 3"/>
-          <p:cNvSpPr>
-            <a:spLocks noGrp="1"/>
-          </p:cNvSpPr>
-          <p:nvPr>
-            <p:ph type="sldNum" sz="quarter" idx="10"/>
-          </p:nvPr>
-        </p:nvSpPr>
-        <p:spPr/>
-        <p:txBody>
-          <a:bodyPr/>
-          <a:lstStyle/>
-          <a:p>
-            <a:fld id="{B0A993B9-56DC-C540-A130-066E4EB4DFC7}" type="slidenum">
-              <a:rPr lang="en-US" smtClean="0"/>
-              <a:t>22</a:t>
-            </a:fld>
-            <a:endParaRPr lang="en-US"/>
-          </a:p>
-        </p:txBody>
-      </p:sp>
-    </p:spTree>
-    <p:extLst>
-      <p:ext uri="{BB962C8B-B14F-4D97-AF65-F5344CB8AC3E}">
-        <p14:creationId xmlns:p14="http://schemas.microsoft.com/office/powerpoint/2010/main" val="3011049496"/>
-      </p:ext>
-    </p:extLst>
-  </p:cSld>
-  <p:clrMapOvr>
-    <a:masterClrMapping/>
-  </p:clrMapOvr>
-</p:notes>
-</file>
-
 <file path=ppt/notesSlides/notesSlide2.xml><?xml version="1.0" encoding="utf-8"?>
 <p:notes xmlns:a="http://schemas.openxmlformats.org/drawingml/2006/main" xmlns:r="http://schemas.openxmlformats.org/officeDocument/2006/relationships" xmlns:p="http://schemas.openxmlformats.org/presentationml/2006/main">
   <p:cSld>
@@ -1949,6 +1597,47 @@
               <a:tabLst/>
               <a:defRPr/>
             </a:pPr>
+            <a:r>
+              <a:rPr lang="en-US" sz="1200" b="0" i="0" u="sng" strike="noStrike" kern="1200" dirty="0" smtClean="0">
+                <a:solidFill>
+                  <a:schemeClr val="tx1"/>
+                </a:solidFill>
+                <a:effectLst/>
+                <a:latin typeface="+mn-lt"/>
+                <a:ea typeface="+mn-ea"/>
+                <a:cs typeface="+mn-cs"/>
+                <a:hlinkClick r:id="rId3"/>
+              </a:rPr>
+              <a:t>https://github.com/nunit/docs/wiki/Visual-Studio-Test-Generator</a:t>
+            </a:r>
+            <a:endParaRPr lang="en-US" sz="1200" b="0" i="0" u="sng" strike="noStrike" kern="1200" dirty="0" smtClean="0">
+              <a:solidFill>
+                <a:schemeClr val="tx1"/>
+              </a:solidFill>
+              <a:effectLst/>
+              <a:latin typeface="+mn-lt"/>
+              <a:ea typeface="+mn-ea"/>
+              <a:cs typeface="+mn-cs"/>
+            </a:endParaRPr>
+          </a:p>
+          <a:p>
+            <a:pPr marL="0" marR="0" indent="0" algn="l" defTabSz="914400" rtl="0" eaLnBrk="1" fontAlgn="auto" latinLnBrk="0" hangingPunct="1">
+              <a:lnSpc>
+                <a:spcPct val="100000"/>
+              </a:lnSpc>
+              <a:spcBef>
+                <a:spcPts val="0"/>
+              </a:spcBef>
+              <a:spcAft>
+                <a:spcPts val="0"/>
+              </a:spcAft>
+              <a:buClrTx/>
+              <a:buSzTx/>
+              <a:buFontTx/>
+              <a:buNone/>
+              <a:tabLst/>
+              <a:defRPr/>
+            </a:pPr>
             <a:endParaRPr lang="en-US" dirty="0" smtClean="0"/>
           </a:p>
           <a:p>
@@ -1993,395 +1682,6 @@
             <a:fld id="{B0A993B9-56DC-C540-A130-066E4EB4DFC7}" type="slidenum">
               <a:rPr lang="en-US" smtClean="0"/>
               <a:t>18</a:t>
-            </a:fld>
-            <a:endParaRPr lang="en-US"/>
-          </a:p>
-        </p:txBody>
-      </p:sp>
-    </p:spTree>
-    <p:extLst>
-      <p:ext uri="{BB962C8B-B14F-4D97-AF65-F5344CB8AC3E}">
-        <p14:creationId xmlns:p14="http://schemas.microsoft.com/office/powerpoint/2010/main" val="3011049496"/>
-      </p:ext>
-    </p:extLst>
-  </p:cSld>
-  <p:clrMapOvr>
-    <a:masterClrMapping/>
-  </p:clrMapOvr>
-</p:notes>
-</file>
-
-<file path=ppt/notesSlides/notesSlide8.xml><?xml version="1.0" encoding="utf-8"?>
-<p:notes xmlns:a="http://schemas.openxmlformats.org/drawingml/2006/main" xmlns:r="http://schemas.openxmlformats.org/officeDocument/2006/relationships" xmlns:p="http://schemas.openxmlformats.org/presentationml/2006/main">
-  <p:cSld>
-    <p:spTree>
-      <p:nvGrpSpPr>
-        <p:cNvPr id="1" name=""/>
-        <p:cNvGrpSpPr/>
-        <p:nvPr/>
-      </p:nvGrpSpPr>
-      <p:grpSpPr>
-        <a:xfrm>
-          <a:off x="0" y="0"/>
-          <a:ext cx="0" cy="0"/>
-          <a:chOff x="0" y="0"/>
-          <a:chExt cx="0" cy="0"/>
-        </a:xfrm>
-      </p:grpSpPr>
-      <p:sp>
-        <p:nvSpPr>
-          <p:cNvPr id="2" name="Slide Image Placeholder 1"/>
-          <p:cNvSpPr>
-            <a:spLocks noGrp="1" noRot="1" noChangeAspect="1"/>
-          </p:cNvSpPr>
-          <p:nvPr>
-            <p:ph type="sldImg"/>
-          </p:nvPr>
-        </p:nvSpPr>
-        <p:spPr/>
-      </p:sp>
-      <p:sp>
-        <p:nvSpPr>
-          <p:cNvPr id="3" name="Notes Placeholder 2"/>
-          <p:cNvSpPr>
-            <a:spLocks noGrp="1"/>
-          </p:cNvSpPr>
-          <p:nvPr>
-            <p:ph type="body" idx="1"/>
-          </p:nvPr>
-        </p:nvSpPr>
-        <p:spPr/>
-        <p:txBody>
-          <a:bodyPr/>
-          <a:lstStyle/>
-          <a:p>
-            <a:r>
-              <a:rPr lang="en-US" sz="1200" b="0" i="0" u="sng" strike="noStrike" kern="1200" dirty="0" smtClean="0">
-                <a:solidFill>
-                  <a:schemeClr val="tx1"/>
-                </a:solidFill>
-                <a:effectLst/>
-                <a:latin typeface="+mn-lt"/>
-                <a:ea typeface="+mn-ea"/>
-                <a:cs typeface="+mn-cs"/>
-              </a:rPr>
-              <a:t>https://github.com/nuni</a:t>
-            </a:r>
-          </a:p>
-          <a:p>
-            <a:r>
-              <a:rPr lang="en-US" sz="1200" b="0" i="0" u="sng" strike="noStrike" kern="1200" dirty="0" smtClean="0">
-                <a:solidFill>
-                  <a:schemeClr val="tx1"/>
-                </a:solidFill>
-                <a:effectLst/>
-                <a:latin typeface="+mn-lt"/>
-                <a:ea typeface="+mn-ea"/>
-                <a:cs typeface="+mn-cs"/>
-              </a:rPr>
-              <a:t>https://github.com/nunit/docs/wiki/NUnit-Documentation</a:t>
-            </a:r>
-          </a:p>
-          <a:p>
-            <a:pPr marL="0" marR="0" indent="0" algn="l" defTabSz="914400" rtl="0" eaLnBrk="1" fontAlgn="auto" latinLnBrk="0" hangingPunct="1">
-              <a:lnSpc>
-                <a:spcPct val="100000"/>
-              </a:lnSpc>
-              <a:spcBef>
-                <a:spcPts val="0"/>
-              </a:spcBef>
-              <a:spcAft>
-                <a:spcPts val="0"/>
-              </a:spcAft>
-              <a:buClrTx/>
-              <a:buSzTx/>
-              <a:buFontTx/>
-              <a:buNone/>
-              <a:tabLst/>
-              <a:defRPr/>
-            </a:pPr>
-            <a:r>
-              <a:rPr lang="en-US" dirty="0" smtClean="0"/>
-              <a:t>https://github.com/nunit/nunit-csharp-samples</a:t>
-            </a:r>
-          </a:p>
-          <a:p>
-            <a:pPr marL="0" marR="0" indent="0" algn="l" defTabSz="914400" rtl="0" eaLnBrk="1" fontAlgn="auto" latinLnBrk="0" hangingPunct="1">
-              <a:lnSpc>
-                <a:spcPct val="100000"/>
-              </a:lnSpc>
-              <a:spcBef>
-                <a:spcPts val="0"/>
-              </a:spcBef>
-              <a:spcAft>
-                <a:spcPts val="0"/>
-              </a:spcAft>
-              <a:buClrTx/>
-              <a:buSzTx/>
-              <a:buFontTx/>
-              <a:buNone/>
-              <a:tabLst/>
-              <a:defRPr/>
-            </a:pPr>
-            <a:endParaRPr lang="en-US" dirty="0" smtClean="0"/>
-          </a:p>
-          <a:p>
-            <a:endParaRPr lang="en-US" sz="1200" b="0" i="0" u="sng" strike="noStrike" kern="1200" dirty="0" smtClean="0">
-              <a:solidFill>
-                <a:schemeClr val="tx1"/>
-              </a:solidFill>
-              <a:effectLst/>
-              <a:latin typeface="+mn-lt"/>
-              <a:ea typeface="+mn-ea"/>
-              <a:cs typeface="+mn-cs"/>
-            </a:endParaRPr>
-          </a:p>
-          <a:p>
-            <a:endParaRPr lang="en-US" sz="1200" b="0" i="0" u="sng" strike="noStrike" kern="1200" dirty="0" smtClean="0">
-              <a:solidFill>
-                <a:schemeClr val="tx1"/>
-              </a:solidFill>
-              <a:effectLst/>
-              <a:latin typeface="+mn-lt"/>
-              <a:ea typeface="+mn-ea"/>
-              <a:cs typeface="+mn-cs"/>
-            </a:endParaRPr>
-          </a:p>
-        </p:txBody>
-      </p:sp>
-      <p:sp>
-        <p:nvSpPr>
-          <p:cNvPr id="4" name="Slide Number Placeholder 3"/>
-          <p:cNvSpPr>
-            <a:spLocks noGrp="1"/>
-          </p:cNvSpPr>
-          <p:nvPr>
-            <p:ph type="sldNum" sz="quarter" idx="10"/>
-          </p:nvPr>
-        </p:nvSpPr>
-        <p:spPr/>
-        <p:txBody>
-          <a:bodyPr/>
-          <a:lstStyle/>
-          <a:p>
-            <a:fld id="{B0A993B9-56DC-C540-A130-066E4EB4DFC7}" type="slidenum">
-              <a:rPr lang="en-US" smtClean="0"/>
-              <a:t>19</a:t>
-            </a:fld>
-            <a:endParaRPr lang="en-US"/>
-          </a:p>
-        </p:txBody>
-      </p:sp>
-    </p:spTree>
-    <p:extLst>
-      <p:ext uri="{BB962C8B-B14F-4D97-AF65-F5344CB8AC3E}">
-        <p14:creationId xmlns:p14="http://schemas.microsoft.com/office/powerpoint/2010/main" val="3011049496"/>
-      </p:ext>
-    </p:extLst>
-  </p:cSld>
-  <p:clrMapOvr>
-    <a:masterClrMapping/>
-  </p:clrMapOvr>
-</p:notes>
-</file>
-
-<file path=ppt/notesSlides/notesSlide9.xml><?xml version="1.0" encoding="utf-8"?>
-<p:notes xmlns:a="http://schemas.openxmlformats.org/drawingml/2006/main" xmlns:r="http://schemas.openxmlformats.org/officeDocument/2006/relationships" xmlns:p="http://schemas.openxmlformats.org/presentationml/2006/main">
-  <p:cSld>
-    <p:spTree>
-      <p:nvGrpSpPr>
-        <p:cNvPr id="1" name=""/>
-        <p:cNvGrpSpPr/>
-        <p:nvPr/>
-      </p:nvGrpSpPr>
-      <p:grpSpPr>
-        <a:xfrm>
-          <a:off x="0" y="0"/>
-          <a:ext cx="0" cy="0"/>
-          <a:chOff x="0" y="0"/>
-          <a:chExt cx="0" cy="0"/>
-        </a:xfrm>
-      </p:grpSpPr>
-      <p:sp>
-        <p:nvSpPr>
-          <p:cNvPr id="2" name="Slide Image Placeholder 1"/>
-          <p:cNvSpPr>
-            <a:spLocks noGrp="1" noRot="1" noChangeAspect="1"/>
-          </p:cNvSpPr>
-          <p:nvPr>
-            <p:ph type="sldImg"/>
-          </p:nvPr>
-        </p:nvSpPr>
-        <p:spPr/>
-      </p:sp>
-      <p:sp>
-        <p:nvSpPr>
-          <p:cNvPr id="3" name="Notes Placeholder 2"/>
-          <p:cNvSpPr>
-            <a:spLocks noGrp="1"/>
-          </p:cNvSpPr>
-          <p:nvPr>
-            <p:ph type="body" idx="1"/>
-          </p:nvPr>
-        </p:nvSpPr>
-        <p:spPr/>
-        <p:txBody>
-          <a:bodyPr/>
-          <a:lstStyle/>
-          <a:p>
-            <a:r>
-              <a:rPr lang="en-US" sz="1200" b="0" i="0" u="sng" strike="noStrike" kern="1200" dirty="0" smtClean="0">
-                <a:solidFill>
-                  <a:schemeClr val="tx1"/>
-                </a:solidFill>
-                <a:effectLst/>
-                <a:latin typeface="+mn-lt"/>
-                <a:ea typeface="+mn-ea"/>
-                <a:cs typeface="+mn-cs"/>
-              </a:rPr>
-              <a:t>https://github.com/nuni</a:t>
-            </a:r>
-          </a:p>
-          <a:p>
-            <a:r>
-              <a:rPr lang="en-US" sz="1200" b="0" i="0" u="sng" strike="noStrike" kern="1200" dirty="0" smtClean="0">
-                <a:solidFill>
-                  <a:schemeClr val="tx1"/>
-                </a:solidFill>
-                <a:effectLst/>
-                <a:latin typeface="+mn-lt"/>
-                <a:ea typeface="+mn-ea"/>
-                <a:cs typeface="+mn-cs"/>
-              </a:rPr>
-              <a:t>https://github.com/nunit/docs/wiki/NUnit-Documentation</a:t>
-            </a:r>
-          </a:p>
-          <a:p>
-            <a:pPr marL="0" marR="0" indent="0" algn="l" defTabSz="914400" rtl="0" eaLnBrk="1" fontAlgn="auto" latinLnBrk="0" hangingPunct="1">
-              <a:lnSpc>
-                <a:spcPct val="100000"/>
-              </a:lnSpc>
-              <a:spcBef>
-                <a:spcPts val="0"/>
-              </a:spcBef>
-              <a:spcAft>
-                <a:spcPts val="0"/>
-              </a:spcAft>
-              <a:buClrTx/>
-              <a:buSzTx/>
-              <a:buFontTx/>
-              <a:buNone/>
-              <a:tabLst/>
-              <a:defRPr/>
-            </a:pPr>
-            <a:r>
-              <a:rPr lang="en-US" dirty="0" smtClean="0"/>
-              <a:t>https://github.com/nunit/nunit-csharp-samples</a:t>
-            </a:r>
-          </a:p>
-          <a:p>
-            <a:pPr marL="0" marR="0" indent="0" algn="l" defTabSz="914400" rtl="0" eaLnBrk="1" fontAlgn="auto" latinLnBrk="0" hangingPunct="1">
-              <a:lnSpc>
-                <a:spcPct val="100000"/>
-              </a:lnSpc>
-              <a:spcBef>
-                <a:spcPts val="0"/>
-              </a:spcBef>
-              <a:spcAft>
-                <a:spcPts val="0"/>
-              </a:spcAft>
-              <a:buClrTx/>
-              <a:buSzTx/>
-              <a:buFontTx/>
-              <a:buNone/>
-              <a:tabLst/>
-              <a:defRPr/>
-            </a:pPr>
-            <a:r>
-              <a:rPr lang="en-US" sz="1200" b="0" i="0" u="sng" strike="noStrike" kern="1200" dirty="0" smtClean="0">
-                <a:solidFill>
-                  <a:schemeClr val="tx1"/>
-                </a:solidFill>
-                <a:effectLst/>
-                <a:latin typeface="+mn-lt"/>
-                <a:ea typeface="+mn-ea"/>
-                <a:cs typeface="+mn-cs"/>
-                <a:hlinkClick r:id="rId3"/>
-              </a:rPr>
-              <a:t>https://github.com/nunit/docs/wiki/Visual-Studio-Test-Generator</a:t>
-            </a:r>
-            <a:endParaRPr lang="en-US" sz="1200" b="0" i="0" u="sng" strike="noStrike" kern="1200" dirty="0" smtClean="0">
-              <a:solidFill>
-                <a:schemeClr val="tx1"/>
-              </a:solidFill>
-              <a:effectLst/>
-              <a:latin typeface="+mn-lt"/>
-              <a:ea typeface="+mn-ea"/>
-              <a:cs typeface="+mn-cs"/>
-            </a:endParaRPr>
-          </a:p>
-          <a:p>
-            <a:pPr marL="0" marR="0" indent="0" algn="l" defTabSz="914400" rtl="0" eaLnBrk="1" fontAlgn="auto" latinLnBrk="0" hangingPunct="1">
-              <a:lnSpc>
-                <a:spcPct val="100000"/>
-              </a:lnSpc>
-              <a:spcBef>
-                <a:spcPts val="0"/>
-              </a:spcBef>
-              <a:spcAft>
-                <a:spcPts val="0"/>
-              </a:spcAft>
-              <a:buClrTx/>
-              <a:buSzTx/>
-              <a:buFontTx/>
-              <a:buNone/>
-              <a:tabLst/>
-              <a:defRPr/>
-            </a:pPr>
-            <a:endParaRPr lang="en-US" dirty="0" smtClean="0"/>
-          </a:p>
-          <a:p>
-            <a:endParaRPr lang="en-US" sz="1200" b="0" i="0" u="sng" strike="noStrike" kern="1200" dirty="0" smtClean="0">
-              <a:solidFill>
-                <a:schemeClr val="tx1"/>
-              </a:solidFill>
-              <a:effectLst/>
-              <a:latin typeface="+mn-lt"/>
-              <a:ea typeface="+mn-ea"/>
-              <a:cs typeface="+mn-cs"/>
-            </a:endParaRPr>
-          </a:p>
-          <a:p>
-            <a:endParaRPr lang="en-US" sz="1200" b="0" i="0" u="sng" strike="noStrike" kern="1200" dirty="0" smtClean="0">
-              <a:solidFill>
-                <a:schemeClr val="tx1"/>
-              </a:solidFill>
-              <a:effectLst/>
-              <a:latin typeface="+mn-lt"/>
-              <a:ea typeface="+mn-ea"/>
-              <a:cs typeface="+mn-cs"/>
-            </a:endParaRPr>
-          </a:p>
-        </p:txBody>
-      </p:sp>
-      <p:sp>
-        <p:nvSpPr>
-          <p:cNvPr id="4" name="Slide Number Placeholder 3"/>
-          <p:cNvSpPr>
-            <a:spLocks noGrp="1"/>
-          </p:cNvSpPr>
-          <p:nvPr>
-            <p:ph type="sldNum" sz="quarter" idx="10"/>
-          </p:nvPr>
-        </p:nvSpPr>
-        <p:spPr/>
-        <p:txBody>
-          <a:bodyPr/>
-          <a:lstStyle/>
-          <a:p>
-            <a:fld id="{B0A993B9-56DC-C540-A130-066E4EB4DFC7}" type="slidenum">
-              <a:rPr lang="en-US" smtClean="0"/>
-              <a:t>20</a:t>
             </a:fld>
             <a:endParaRPr lang="en-US"/>
           </a:p>
@@ -2594,7 +1894,7 @@
           <a:p>
             <a:fld id="{1E00E3DC-ED14-4ED2-9927-B1FDC4F9F551}" type="datetimeFigureOut">
               <a:rPr lang="en-US" smtClean="0"/>
-              <a:t>4/12/2021</a:t>
+              <a:t>7/18/2021</a:t>
             </a:fld>
             <a:endParaRPr lang="en-US"/>
           </a:p>
@@ -2759,7 +2059,7 @@
           <a:p>
             <a:fld id="{1E00E3DC-ED14-4ED2-9927-B1FDC4F9F551}" type="datetimeFigureOut">
               <a:rPr lang="en-US" smtClean="0"/>
-              <a:t>4/12/2021</a:t>
+              <a:t>7/18/2021</a:t>
             </a:fld>
             <a:endParaRPr lang="en-US"/>
           </a:p>
@@ -2934,7 +2234,7 @@
           <a:p>
             <a:fld id="{1E00E3DC-ED14-4ED2-9927-B1FDC4F9F551}" type="datetimeFigureOut">
               <a:rPr lang="en-US" smtClean="0"/>
-              <a:t>4/12/2021</a:t>
+              <a:t>7/18/2021</a:t>
             </a:fld>
             <a:endParaRPr lang="en-US"/>
           </a:p>
@@ -3299,7 +2599,7 @@
           <a:p>
             <a:fld id="{6154146A-EEF2-4447-9B63-1093335E8C99}" type="datetime1">
               <a:rPr lang="en-US" smtClean="0"/>
-              <a:t>4/12/2021</a:t>
+              <a:t>7/18/2021</a:t>
             </a:fld>
             <a:endParaRPr lang="en-US"/>
           </a:p>
@@ -3545,7 +2845,7 @@
           <a:p>
             <a:fld id="{1E00E3DC-ED14-4ED2-9927-B1FDC4F9F551}" type="datetimeFigureOut">
               <a:rPr lang="en-US" smtClean="0"/>
-              <a:t>4/12/2021</a:t>
+              <a:t>7/18/2021</a:t>
             </a:fld>
             <a:endParaRPr lang="en-US"/>
           </a:p>
@@ -3828,7 +3128,7 @@
           <a:p>
             <a:fld id="{1E00E3DC-ED14-4ED2-9927-B1FDC4F9F551}" type="datetimeFigureOut">
               <a:rPr lang="en-US" smtClean="0"/>
-              <a:t>4/12/2021</a:t>
+              <a:t>7/18/2021</a:t>
             </a:fld>
             <a:endParaRPr lang="en-US"/>
           </a:p>
@@ -4257,7 +3557,7 @@
           <a:p>
             <a:fld id="{1E00E3DC-ED14-4ED2-9927-B1FDC4F9F551}" type="datetimeFigureOut">
               <a:rPr lang="en-US" smtClean="0"/>
-              <a:t>4/12/2021</a:t>
+              <a:t>7/18/2021</a:t>
             </a:fld>
             <a:endParaRPr lang="en-US"/>
           </a:p>
@@ -4370,7 +3670,7 @@
           <a:p>
             <a:fld id="{1E00E3DC-ED14-4ED2-9927-B1FDC4F9F551}" type="datetimeFigureOut">
               <a:rPr lang="en-US" smtClean="0"/>
-              <a:t>4/12/2021</a:t>
+              <a:t>7/18/2021</a:t>
             </a:fld>
             <a:endParaRPr lang="en-US"/>
           </a:p>
@@ -4460,7 +3760,7 @@
           <a:p>
             <a:fld id="{1E00E3DC-ED14-4ED2-9927-B1FDC4F9F551}" type="datetimeFigureOut">
               <a:rPr lang="en-US" smtClean="0"/>
-              <a:t>4/12/2021</a:t>
+              <a:t>7/18/2021</a:t>
             </a:fld>
             <a:endParaRPr lang="en-US"/>
           </a:p>
@@ -4649,7 +3949,7 @@
           <a:p>
             <a:fld id="{1E00E3DC-ED14-4ED2-9927-B1FDC4F9F551}" type="datetimeFigureOut">
               <a:rPr lang="en-US" smtClean="0"/>
-              <a:t>4/12/2021</a:t>
+              <a:t>7/18/2021</a:t>
             </a:fld>
             <a:endParaRPr lang="en-US"/>
           </a:p>
@@ -4967,7 +4267,7 @@
           <a:p>
             <a:fld id="{1E00E3DC-ED14-4ED2-9927-B1FDC4F9F551}" type="datetimeFigureOut">
               <a:rPr lang="en-US" smtClean="0"/>
-              <a:t>4/12/2021</a:t>
+              <a:t>7/18/2021</a:t>
             </a:fld>
             <a:endParaRPr lang="en-US"/>
           </a:p>
@@ -5346,7 +4646,7 @@
           <a:p>
             <a:fld id="{1E00E3DC-ED14-4ED2-9927-B1FDC4F9F551}" type="datetimeFigureOut">
               <a:rPr lang="en-US" smtClean="0"/>
-              <a:t>4/12/2021</a:t>
+              <a:t>7/18/2021</a:t>
             </a:fld>
             <a:endParaRPr lang="en-US"/>
           </a:p>
@@ -6141,61 +5441,7 @@
               <a:buFont typeface="Arial" panose="020B0604020202020204" pitchFamily="34" charset="0"/>
               <a:buChar char="•"/>
             </a:pPr>
-            <a:r>
-              <a:rPr lang="en-US" sz="2400" dirty="0" smtClean="0"/>
-              <a:t>Go </a:t>
-            </a:r>
-            <a:r>
-              <a:rPr lang="en-US" sz="2400" dirty="0"/>
-              <a:t>to </a:t>
-            </a:r>
-            <a:r>
-              <a:rPr lang="en-US" sz="2400" dirty="0">
-                <a:hlinkClick r:id="rId2"/>
-              </a:rPr>
-              <a:t>https://</a:t>
-            </a:r>
-            <a:r>
-              <a:rPr lang="en-US" sz="2400" dirty="0" smtClean="0">
-                <a:hlinkClick r:id="rId2"/>
-              </a:rPr>
-              <a:t>github.com/bilalshahzad139/UnitTestingTraining</a:t>
-            </a:r>
             <a:endParaRPr lang="en-US" sz="2400" dirty="0" smtClean="0"/>
-          </a:p>
-          <a:p>
-            <a:pPr marL="228600" indent="-228600">
-              <a:buFont typeface="Arial" panose="020B0604020202020204" pitchFamily="34" charset="0"/>
-              <a:buChar char="•"/>
-            </a:pPr>
-            <a:r>
-              <a:rPr lang="en-US" sz="2400" dirty="0" smtClean="0"/>
-              <a:t>Download the Repository</a:t>
-            </a:r>
-          </a:p>
-          <a:p>
-            <a:pPr marL="228600" indent="-228600">
-              <a:buFont typeface="Arial" panose="020B0604020202020204" pitchFamily="34" charset="0"/>
-              <a:buChar char="•"/>
-            </a:pPr>
-            <a:r>
-              <a:rPr lang="en-US" sz="2400" dirty="0"/>
-              <a:t>Open Sample1 -&gt; </a:t>
-            </a:r>
-            <a:r>
-              <a:rPr lang="en-US" sz="2400" dirty="0" smtClean="0"/>
-              <a:t>MainConsoleApp.sln</a:t>
-            </a:r>
-          </a:p>
-          <a:p>
-            <a:pPr marL="228600" indent="-228600">
-              <a:buFont typeface="Arial" panose="020B0604020202020204" pitchFamily="34" charset="0"/>
-              <a:buChar char="•"/>
-            </a:pPr>
-            <a:r>
-              <a:rPr lang="en-US" sz="2400" dirty="0" smtClean="0"/>
-              <a:t>Discussion on the code</a:t>
-            </a:r>
           </a:p>
           <a:p>
             <a:pPr marL="228600" indent="-228600">
@@ -6295,202 +5541,6 @@
                                           <p:spTgt spid="3">
                                             <p:txEl>
                                               <p:pRg st="0" end="0"/>
-                                            </p:txEl>
-                                          </p:spTgt>
-                                        </p:tgtEl>
-                                        <p:attrNameLst>
-                                          <p:attrName>style.visibility</p:attrName>
-                                        </p:attrNameLst>
-                                      </p:cBhvr>
-                                      <p:to>
-                                        <p:strVal val="visible"/>
-                                      </p:to>
-                                    </p:set>
-                                  </p:childTnLst>
-                                </p:cTn>
-                              </p:par>
-                            </p:childTnLst>
-                          </p:cTn>
-                        </p:par>
-                      </p:childTnLst>
-                    </p:cTn>
-                  </p:par>
-                  <p:par>
-                    <p:cTn id="7" fill="hold">
-                      <p:stCondLst>
-                        <p:cond delay="indefinite"/>
-                      </p:stCondLst>
-                      <p:childTnLst>
-                        <p:par>
-                          <p:cTn id="8" fill="hold">
-                            <p:stCondLst>
-                              <p:cond delay="0"/>
-                            </p:stCondLst>
-                            <p:childTnLst>
-                              <p:par>
-                                <p:cTn id="9" presetID="1" presetClass="entr" presetSubtype="0" fill="hold" nodeType="clickEffect">
-                                  <p:stCondLst>
-                                    <p:cond delay="0"/>
-                                  </p:stCondLst>
-                                  <p:childTnLst>
-                                    <p:set>
-                                      <p:cBhvr>
-                                        <p:cTn id="10" dur="1" fill="hold">
-                                          <p:stCondLst>
-                                            <p:cond delay="0"/>
-                                          </p:stCondLst>
-                                        </p:cTn>
-                                        <p:tgtEl>
-                                          <p:spTgt spid="3">
-                                            <p:txEl>
-                                              <p:pRg st="1" end="1"/>
-                                            </p:txEl>
-                                          </p:spTgt>
-                                        </p:tgtEl>
-                                        <p:attrNameLst>
-                                          <p:attrName>style.visibility</p:attrName>
-                                        </p:attrNameLst>
-                                      </p:cBhvr>
-                                      <p:to>
-                                        <p:strVal val="visible"/>
-                                      </p:to>
-                                    </p:set>
-                                  </p:childTnLst>
-                                </p:cTn>
-                              </p:par>
-                            </p:childTnLst>
-                          </p:cTn>
-                        </p:par>
-                      </p:childTnLst>
-                    </p:cTn>
-                  </p:par>
-                  <p:par>
-                    <p:cTn id="11" fill="hold">
-                      <p:stCondLst>
-                        <p:cond delay="indefinite"/>
-                      </p:stCondLst>
-                      <p:childTnLst>
-                        <p:par>
-                          <p:cTn id="12" fill="hold">
-                            <p:stCondLst>
-                              <p:cond delay="0"/>
-                            </p:stCondLst>
-                            <p:childTnLst>
-                              <p:par>
-                                <p:cTn id="13" presetID="1" presetClass="entr" presetSubtype="0" fill="hold" nodeType="clickEffect">
-                                  <p:stCondLst>
-                                    <p:cond delay="0"/>
-                                  </p:stCondLst>
-                                  <p:childTnLst>
-                                    <p:set>
-                                      <p:cBhvr>
-                                        <p:cTn id="14" dur="1" fill="hold">
-                                          <p:stCondLst>
-                                            <p:cond delay="0"/>
-                                          </p:stCondLst>
-                                        </p:cTn>
-                                        <p:tgtEl>
-                                          <p:spTgt spid="3">
-                                            <p:txEl>
-                                              <p:pRg st="2" end="2"/>
-                                            </p:txEl>
-                                          </p:spTgt>
-                                        </p:tgtEl>
-                                        <p:attrNameLst>
-                                          <p:attrName>style.visibility</p:attrName>
-                                        </p:attrNameLst>
-                                      </p:cBhvr>
-                                      <p:to>
-                                        <p:strVal val="visible"/>
-                                      </p:to>
-                                    </p:set>
-                                  </p:childTnLst>
-                                </p:cTn>
-                              </p:par>
-                            </p:childTnLst>
-                          </p:cTn>
-                        </p:par>
-                      </p:childTnLst>
-                    </p:cTn>
-                  </p:par>
-                  <p:par>
-                    <p:cTn id="15" fill="hold">
-                      <p:stCondLst>
-                        <p:cond delay="indefinite"/>
-                      </p:stCondLst>
-                      <p:childTnLst>
-                        <p:par>
-                          <p:cTn id="16" fill="hold">
-                            <p:stCondLst>
-                              <p:cond delay="0"/>
-                            </p:stCondLst>
-                            <p:childTnLst>
-                              <p:par>
-                                <p:cTn id="17" presetID="1" presetClass="entr" presetSubtype="0" fill="hold" nodeType="clickEffect">
-                                  <p:stCondLst>
-                                    <p:cond delay="0"/>
-                                  </p:stCondLst>
-                                  <p:childTnLst>
-                                    <p:set>
-                                      <p:cBhvr>
-                                        <p:cTn id="18" dur="1" fill="hold">
-                                          <p:stCondLst>
-                                            <p:cond delay="0"/>
-                                          </p:stCondLst>
-                                        </p:cTn>
-                                        <p:tgtEl>
-                                          <p:spTgt spid="3">
-                                            <p:txEl>
-                                              <p:pRg st="3" end="3"/>
-                                            </p:txEl>
-                                          </p:spTgt>
-                                        </p:tgtEl>
-                                        <p:attrNameLst>
-                                          <p:attrName>style.visibility</p:attrName>
-                                        </p:attrNameLst>
-                                      </p:cBhvr>
-                                      <p:to>
-                                        <p:strVal val="visible"/>
-                                      </p:to>
-                                    </p:set>
-                                  </p:childTnLst>
-                                </p:cTn>
-                              </p:par>
-                            </p:childTnLst>
-                          </p:cTn>
-                        </p:par>
-                      </p:childTnLst>
-                    </p:cTn>
-                  </p:par>
-                  <p:par>
-                    <p:cTn id="19" fill="hold">
-                      <p:stCondLst>
-                        <p:cond delay="indefinite"/>
-                      </p:stCondLst>
-                      <p:childTnLst>
-                        <p:par>
-                          <p:cTn id="20" fill="hold">
-                            <p:stCondLst>
-                              <p:cond delay="0"/>
-                            </p:stCondLst>
-                            <p:childTnLst>
-                              <p:par>
-                                <p:cTn id="21" presetID="1" presetClass="entr" presetSubtype="0" fill="hold" nodeType="clickEffect">
-                                  <p:stCondLst>
-                                    <p:cond delay="0"/>
-                                  </p:stCondLst>
-                                  <p:childTnLst>
-                                    <p:set>
-                                      <p:cBhvr>
-                                        <p:cTn id="22" dur="1" fill="hold">
-                                          <p:stCondLst>
-                                            <p:cond delay="0"/>
-                                          </p:stCondLst>
-                                        </p:cTn>
-                                        <p:tgtEl>
-                                          <p:spTgt spid="3">
-                                            <p:txEl>
-                                              <p:pRg st="4" end="4"/>
                                             </p:txEl>
                                           </p:spTgt>
                                         </p:tgtEl>
@@ -8993,387 +8043,6 @@
           <a:p>
             <a:r>
               <a:rPr lang="en-US" dirty="0" smtClean="0"/>
-              <a:t>Demo 2 - Solution</a:t>
-            </a:r>
-            <a:endParaRPr lang="en-US" dirty="0">
-              <a:latin typeface="+mn-lt"/>
-            </a:endParaRPr>
-          </a:p>
-        </p:txBody>
-      </p:sp>
-      <p:sp>
-        <p:nvSpPr>
-          <p:cNvPr id="3" name="Subtitle 2"/>
-          <p:cNvSpPr>
-            <a:spLocks noGrp="1"/>
-          </p:cNvSpPr>
-          <p:nvPr>
-            <p:ph type="subTitle" idx="1"/>
-          </p:nvPr>
-        </p:nvSpPr>
-        <p:spPr>
-          <a:xfrm>
-            <a:off x="573586" y="2011680"/>
-            <a:ext cx="9199063" cy="4245685"/>
-          </a:xfrm>
-        </p:spPr>
-        <p:txBody>
-          <a:bodyPr/>
-          <a:lstStyle/>
-          <a:p>
-            <a:pPr marL="228600" indent="-228600">
-              <a:buFont typeface="Arial" panose="020B0604020202020204" pitchFamily="34" charset="0"/>
-              <a:buChar char="•"/>
-            </a:pPr>
-            <a:r>
-              <a:rPr lang="en-US" sz="2400" dirty="0"/>
-              <a:t>Open </a:t>
-            </a:r>
-            <a:r>
-              <a:rPr lang="en-US" sz="2400" dirty="0" smtClean="0">
-                <a:solidFill>
-                  <a:srgbClr val="FF0000"/>
-                </a:solidFill>
-              </a:rPr>
-              <a:t>Sample2</a:t>
-            </a:r>
-            <a:r>
-              <a:rPr lang="en-US" sz="2400" dirty="0" smtClean="0"/>
-              <a:t> </a:t>
-            </a:r>
-            <a:r>
-              <a:rPr lang="en-US" sz="2400" dirty="0"/>
-              <a:t>-&gt; MainConsoleApp.sln</a:t>
-            </a:r>
-          </a:p>
-          <a:p>
-            <a:pPr marL="228600" indent="-228600">
-              <a:buFont typeface="Arial" panose="020B0604020202020204" pitchFamily="34" charset="0"/>
-              <a:buChar char="•"/>
-            </a:pPr>
-            <a:r>
-              <a:rPr lang="en-US" sz="2400" dirty="0" smtClean="0"/>
-              <a:t>Rebuild the Solution</a:t>
-            </a:r>
-          </a:p>
-          <a:p>
-            <a:pPr marL="228600" indent="-228600">
-              <a:buFont typeface="Arial" panose="020B0604020202020204" pitchFamily="34" charset="0"/>
-              <a:buChar char="•"/>
-            </a:pPr>
-            <a:r>
-              <a:rPr lang="en-US" sz="2400" dirty="0" smtClean="0"/>
-              <a:t>Check and play with </a:t>
-            </a:r>
-            <a:r>
-              <a:rPr lang="en-US" sz="2400" dirty="0" err="1" smtClean="0"/>
-              <a:t>AppBAL.Tests</a:t>
-            </a:r>
-            <a:r>
-              <a:rPr lang="en-US" sz="2400" dirty="0" smtClean="0"/>
-              <a:t> Project</a:t>
-            </a:r>
-          </a:p>
-          <a:p>
-            <a:endParaRPr lang="en-US" sz="2400" dirty="0" smtClean="0"/>
-          </a:p>
-          <a:p>
-            <a:pPr marL="228600" indent="-228600">
-              <a:buFont typeface="Arial" panose="020B0604020202020204" pitchFamily="34" charset="0"/>
-              <a:buChar char="•"/>
-            </a:pPr>
-            <a:endParaRPr lang="en-US" sz="2400" dirty="0" smtClean="0"/>
-          </a:p>
-          <a:p>
-            <a:pPr lvl="1" algn="l"/>
-            <a:endParaRPr lang="en-US" dirty="0">
-              <a:solidFill>
-                <a:srgbClr val="FF0000"/>
-              </a:solidFill>
-            </a:endParaRPr>
-          </a:p>
-          <a:p>
-            <a:pPr marL="228600" indent="-228600">
-              <a:buFont typeface="Arial" panose="020B0604020202020204" pitchFamily="34" charset="0"/>
-              <a:buChar char="•"/>
-            </a:pPr>
-            <a:endParaRPr lang="en-US" sz="2400" dirty="0"/>
-          </a:p>
-          <a:p>
-            <a:pPr marL="228600" indent="-228600">
-              <a:buFont typeface="Arial" panose="020B0604020202020204" pitchFamily="34" charset="0"/>
-              <a:buChar char="•"/>
-            </a:pPr>
-            <a:endParaRPr lang="en-US" sz="2400" dirty="0" smtClean="0"/>
-          </a:p>
-          <a:p>
-            <a:pPr marL="228600" indent="-228600">
-              <a:buFont typeface="Arial" panose="020B0604020202020204" pitchFamily="34" charset="0"/>
-              <a:buChar char="•"/>
-            </a:pPr>
-            <a:endParaRPr lang="en-US" sz="2400" dirty="0" smtClean="0"/>
-          </a:p>
-          <a:p>
-            <a:pPr marL="228600" indent="-228600">
-              <a:buFont typeface="Arial" panose="020B0604020202020204" pitchFamily="34" charset="0"/>
-              <a:buChar char="•"/>
-            </a:pPr>
-            <a:endParaRPr lang="en-US" sz="2600" dirty="0"/>
-          </a:p>
-          <a:p>
-            <a:pPr marL="228600" indent="-228600">
-              <a:buFont typeface="Arial" panose="020B0604020202020204" pitchFamily="34" charset="0"/>
-              <a:buChar char="•"/>
-            </a:pPr>
-            <a:endParaRPr lang="en-US" sz="2400" dirty="0" smtClean="0"/>
-          </a:p>
-          <a:p>
-            <a:pPr marL="685800" lvl="1" indent="-228600">
-              <a:buFont typeface="Arial" panose="020B0604020202020204" pitchFamily="34" charset="0"/>
-              <a:buChar char="•"/>
-            </a:pPr>
-            <a:endParaRPr lang="en-US" sz="2400" dirty="0"/>
-          </a:p>
-          <a:p>
-            <a:pPr marL="228600" indent="-228600">
-              <a:buFont typeface="Arial" panose="020B0604020202020204" pitchFamily="34" charset="0"/>
-              <a:buChar char="•"/>
-            </a:pPr>
-            <a:endParaRPr lang="en-US" dirty="0" smtClean="0"/>
-          </a:p>
-          <a:p>
-            <a:pPr marL="228600" indent="-228600">
-              <a:buFont typeface="Arial" panose="020B0604020202020204" pitchFamily="34" charset="0"/>
-              <a:buChar char="•"/>
-            </a:pPr>
-            <a:endParaRPr lang="en-US" dirty="0"/>
-          </a:p>
-        </p:txBody>
-      </p:sp>
-    </p:spTree>
-    <p:extLst>
-      <p:ext uri="{BB962C8B-B14F-4D97-AF65-F5344CB8AC3E}">
-        <p14:creationId xmlns:p14="http://schemas.microsoft.com/office/powerpoint/2010/main" val="3609447129"/>
-      </p:ext>
-    </p:extLst>
-  </p:cSld>
-  <p:clrMapOvr>
-    <a:masterClrMapping/>
-  </p:clrMapOvr>
-  <p:timing>
-    <p:tnLst>
-      <p:par>
-        <p:cTn id="1" dur="indefinite" restart="never" nodeType="tmRoot">
-          <p:childTnLst>
-            <p:seq concurrent="1" nextAc="seek">
-              <p:cTn id="2" dur="indefinite" nodeType="mainSeq">
-                <p:childTnLst>
-                  <p:par>
-                    <p:cTn id="3" fill="hold">
-                      <p:stCondLst>
-                        <p:cond delay="indefinite"/>
-                      </p:stCondLst>
-                      <p:childTnLst>
-                        <p:par>
-                          <p:cTn id="4" fill="hold">
-                            <p:stCondLst>
-                              <p:cond delay="0"/>
-                            </p:stCondLst>
-                            <p:childTnLst>
-                              <p:par>
-                                <p:cTn id="5" presetID="1" presetClass="entr" presetSubtype="0" fill="hold" nodeType="clickEffect">
-                                  <p:stCondLst>
-                                    <p:cond delay="0"/>
-                                  </p:stCondLst>
-                                  <p:childTnLst>
-                                    <p:set>
-                                      <p:cBhvr>
-                                        <p:cTn id="6" dur="1" fill="hold">
-                                          <p:stCondLst>
-                                            <p:cond delay="0"/>
-                                          </p:stCondLst>
-                                        </p:cTn>
-                                        <p:tgtEl>
-                                          <p:spTgt spid="3">
-                                            <p:txEl>
-                                              <p:pRg st="0" end="0"/>
-                                            </p:txEl>
-                                          </p:spTgt>
-                                        </p:tgtEl>
-                                        <p:attrNameLst>
-                                          <p:attrName>style.visibility</p:attrName>
-                                        </p:attrNameLst>
-                                      </p:cBhvr>
-                                      <p:to>
-                                        <p:strVal val="visible"/>
-                                      </p:to>
-                                    </p:set>
-                                  </p:childTnLst>
-                                </p:cTn>
-                              </p:par>
-                            </p:childTnLst>
-                          </p:cTn>
-                        </p:par>
-                      </p:childTnLst>
-                    </p:cTn>
-                  </p:par>
-                  <p:par>
-                    <p:cTn id="7" fill="hold">
-                      <p:stCondLst>
-                        <p:cond delay="indefinite"/>
-                      </p:stCondLst>
-                      <p:childTnLst>
-                        <p:par>
-                          <p:cTn id="8" fill="hold">
-                            <p:stCondLst>
-                              <p:cond delay="0"/>
-                            </p:stCondLst>
-                            <p:childTnLst>
-                              <p:par>
-                                <p:cTn id="9" presetID="1" presetClass="entr" presetSubtype="0" fill="hold" nodeType="clickEffect">
-                                  <p:stCondLst>
-                                    <p:cond delay="0"/>
-                                  </p:stCondLst>
-                                  <p:childTnLst>
-                                    <p:set>
-                                      <p:cBhvr>
-                                        <p:cTn id="10" dur="1" fill="hold">
-                                          <p:stCondLst>
-                                            <p:cond delay="0"/>
-                                          </p:stCondLst>
-                                        </p:cTn>
-                                        <p:tgtEl>
-                                          <p:spTgt spid="3">
-                                            <p:txEl>
-                                              <p:pRg st="1" end="1"/>
-                                            </p:txEl>
-                                          </p:spTgt>
-                                        </p:tgtEl>
-                                        <p:attrNameLst>
-                                          <p:attrName>style.visibility</p:attrName>
-                                        </p:attrNameLst>
-                                      </p:cBhvr>
-                                      <p:to>
-                                        <p:strVal val="visible"/>
-                                      </p:to>
-                                    </p:set>
-                                  </p:childTnLst>
-                                </p:cTn>
-                              </p:par>
-                            </p:childTnLst>
-                          </p:cTn>
-                        </p:par>
-                      </p:childTnLst>
-                    </p:cTn>
-                  </p:par>
-                  <p:par>
-                    <p:cTn id="11" fill="hold">
-                      <p:stCondLst>
-                        <p:cond delay="indefinite"/>
-                      </p:stCondLst>
-                      <p:childTnLst>
-                        <p:par>
-                          <p:cTn id="12" fill="hold">
-                            <p:stCondLst>
-                              <p:cond delay="0"/>
-                            </p:stCondLst>
-                            <p:childTnLst>
-                              <p:par>
-                                <p:cTn id="13" presetID="1" presetClass="entr" presetSubtype="0" fill="hold" nodeType="clickEffect">
-                                  <p:stCondLst>
-                                    <p:cond delay="0"/>
-                                  </p:stCondLst>
-                                  <p:childTnLst>
-                                    <p:set>
-                                      <p:cBhvr>
-                                        <p:cTn id="14" dur="1" fill="hold">
-                                          <p:stCondLst>
-                                            <p:cond delay="0"/>
-                                          </p:stCondLst>
-                                        </p:cTn>
-                                        <p:tgtEl>
-                                          <p:spTgt spid="3">
-                                            <p:txEl>
-                                              <p:pRg st="2" end="2"/>
-                                            </p:txEl>
-                                          </p:spTgt>
-                                        </p:tgtEl>
-                                        <p:attrNameLst>
-                                          <p:attrName>style.visibility</p:attrName>
-                                        </p:attrNameLst>
-                                      </p:cBhvr>
-                                      <p:to>
-                                        <p:strVal val="visible"/>
-                                      </p:to>
-                                    </p:set>
-                                  </p:childTnLst>
-                                </p:cTn>
-                              </p:par>
-                            </p:childTnLst>
-                          </p:cTn>
-                        </p:par>
-                      </p:childTnLst>
-                    </p:cTn>
-                  </p:par>
-                </p:childTnLst>
-              </p:cTn>
-              <p:prevCondLst>
-                <p:cond evt="onPrev" delay="0">
-                  <p:tgtEl>
-                    <p:sldTgt/>
-                  </p:tgtEl>
-                </p:cond>
-              </p:prevCondLst>
-              <p:nextCondLst>
-                <p:cond evt="onNext" delay="0">
-                  <p:tgtEl>
-                    <p:sldTgt/>
-                  </p:tgtEl>
-                </p:cond>
-              </p:nextCondLst>
-            </p:seq>
-          </p:childTnLst>
-        </p:cTn>
-      </p:par>
-    </p:tnLst>
-  </p:timing>
-</p:sld>
-</file>
-
-<file path=ppt/slides/slide17.xml><?xml version="1.0" encoding="utf-8"?>
-<p:sld xmlns:a="http://schemas.openxmlformats.org/drawingml/2006/main" xmlns:r="http://schemas.openxmlformats.org/officeDocument/2006/relationships" xmlns:p="http://schemas.openxmlformats.org/presentationml/2006/main">
-  <p:cSld>
-    <p:spTree>
-      <p:nvGrpSpPr>
-        <p:cNvPr id="1" name=""/>
-        <p:cNvGrpSpPr/>
-        <p:nvPr/>
-      </p:nvGrpSpPr>
-      <p:grpSpPr>
-        <a:xfrm>
-          <a:off x="0" y="0"/>
-          <a:ext cx="0" cy="0"/>
-          <a:chOff x="0" y="0"/>
-          <a:chExt cx="0" cy="0"/>
-        </a:xfrm>
-      </p:grpSpPr>
-      <p:sp>
-        <p:nvSpPr>
-          <p:cNvPr id="2" name="Title 1"/>
-          <p:cNvSpPr>
-            <a:spLocks noGrp="1"/>
-          </p:cNvSpPr>
-          <p:nvPr>
-            <p:ph type="title"/>
-          </p:nvPr>
-        </p:nvSpPr>
-        <p:spPr/>
-        <p:txBody>
-          <a:bodyPr/>
-          <a:lstStyle/>
-          <a:p>
-            <a:r>
-              <a:rPr lang="en-US" dirty="0" smtClean="0"/>
               <a:t>So Unit Testing is that Easy?</a:t>
             </a:r>
             <a:endParaRPr lang="en-US" dirty="0">
@@ -9678,7 +8347,7 @@
 </p:sld>
 </file>
 
-<file path=ppt/slides/slide18.xml><?xml version="1.0" encoding="utf-8"?>
+<file path=ppt/slides/slide17.xml><?xml version="1.0" encoding="utf-8"?>
 <p:sld xmlns:a="http://schemas.openxmlformats.org/drawingml/2006/main" xmlns:r="http://schemas.openxmlformats.org/officeDocument/2006/relationships" xmlns:p="http://schemas.openxmlformats.org/presentationml/2006/main">
   <p:cSld>
     <p:spTree>
@@ -10210,990 +8879,7 @@
 </p:sld>
 </file>
 
-<file path=ppt/slides/slide19.xml><?xml version="1.0" encoding="utf-8"?>
-<p:sld xmlns:a="http://schemas.openxmlformats.org/drawingml/2006/main" xmlns:r="http://schemas.openxmlformats.org/officeDocument/2006/relationships" xmlns:p="http://schemas.openxmlformats.org/presentationml/2006/main">
-  <p:cSld>
-    <p:spTree>
-      <p:nvGrpSpPr>
-        <p:cNvPr id="1" name=""/>
-        <p:cNvGrpSpPr/>
-        <p:nvPr/>
-      </p:nvGrpSpPr>
-      <p:grpSpPr>
-        <a:xfrm>
-          <a:off x="0" y="0"/>
-          <a:ext cx="0" cy="0"/>
-          <a:chOff x="0" y="0"/>
-          <a:chExt cx="0" cy="0"/>
-        </a:xfrm>
-      </p:grpSpPr>
-      <p:sp>
-        <p:nvSpPr>
-          <p:cNvPr id="2" name="Title 1"/>
-          <p:cNvSpPr>
-            <a:spLocks noGrp="1"/>
-          </p:cNvSpPr>
-          <p:nvPr>
-            <p:ph type="title"/>
-          </p:nvPr>
-        </p:nvSpPr>
-        <p:spPr/>
-        <p:txBody>
-          <a:bodyPr/>
-          <a:lstStyle/>
-          <a:p>
-            <a:r>
-              <a:rPr lang="en-US" dirty="0" smtClean="0"/>
-              <a:t>Demo 3 - Solution</a:t>
-            </a:r>
-            <a:endParaRPr lang="en-US" dirty="0">
-              <a:latin typeface="+mn-lt"/>
-            </a:endParaRPr>
-          </a:p>
-        </p:txBody>
-      </p:sp>
-      <p:sp>
-        <p:nvSpPr>
-          <p:cNvPr id="3" name="Subtitle 2"/>
-          <p:cNvSpPr>
-            <a:spLocks noGrp="1"/>
-          </p:cNvSpPr>
-          <p:nvPr>
-            <p:ph type="subTitle" idx="1"/>
-          </p:nvPr>
-        </p:nvSpPr>
-        <p:spPr>
-          <a:xfrm>
-            <a:off x="573586" y="2011680"/>
-            <a:ext cx="9199063" cy="4245685"/>
-          </a:xfrm>
-        </p:spPr>
-        <p:txBody>
-          <a:bodyPr/>
-          <a:lstStyle/>
-          <a:p>
-            <a:pPr marL="228600" indent="-228600">
-              <a:buFont typeface="Arial" panose="020B0604020202020204" pitchFamily="34" charset="0"/>
-              <a:buChar char="•"/>
-            </a:pPr>
-            <a:r>
-              <a:rPr lang="en-US" sz="2400" dirty="0"/>
-              <a:t>Open </a:t>
-            </a:r>
-            <a:r>
-              <a:rPr lang="en-US" sz="2400" dirty="0" smtClean="0">
-                <a:solidFill>
-                  <a:srgbClr val="FF0000"/>
-                </a:solidFill>
-              </a:rPr>
-              <a:t>Sample3</a:t>
-            </a:r>
-            <a:r>
-              <a:rPr lang="en-US" sz="2400" dirty="0" smtClean="0"/>
-              <a:t> </a:t>
-            </a:r>
-            <a:r>
-              <a:rPr lang="en-US" sz="2400" dirty="0"/>
-              <a:t>-&gt; MainConsoleApp.sln</a:t>
-            </a:r>
-          </a:p>
-          <a:p>
-            <a:pPr marL="228600" indent="-228600">
-              <a:buFont typeface="Arial" panose="020B0604020202020204" pitchFamily="34" charset="0"/>
-              <a:buChar char="•"/>
-            </a:pPr>
-            <a:r>
-              <a:rPr lang="en-US" sz="2400" dirty="0" smtClean="0"/>
-              <a:t>Rebuild the Solution</a:t>
-            </a:r>
-          </a:p>
-          <a:p>
-            <a:pPr marL="228600" indent="-228600">
-              <a:buFont typeface="Arial" panose="020B0604020202020204" pitchFamily="34" charset="0"/>
-              <a:buChar char="•"/>
-            </a:pPr>
-            <a:r>
-              <a:rPr lang="en-US" sz="2400" dirty="0" smtClean="0"/>
-              <a:t>Check and play with </a:t>
-            </a:r>
-            <a:r>
-              <a:rPr lang="en-US" sz="2400" dirty="0" err="1" smtClean="0"/>
-              <a:t>AppBAL.Tests</a:t>
-            </a:r>
-            <a:r>
-              <a:rPr lang="en-US" sz="2400" dirty="0" smtClean="0"/>
-              <a:t> Project</a:t>
-            </a:r>
-          </a:p>
-          <a:p>
-            <a:endParaRPr lang="en-US" sz="2400" dirty="0" smtClean="0"/>
-          </a:p>
-          <a:p>
-            <a:pPr marL="228600" indent="-228600">
-              <a:buFont typeface="Arial" panose="020B0604020202020204" pitchFamily="34" charset="0"/>
-              <a:buChar char="•"/>
-            </a:pPr>
-            <a:endParaRPr lang="en-US" sz="2400" dirty="0" smtClean="0"/>
-          </a:p>
-          <a:p>
-            <a:pPr lvl="1" algn="l"/>
-            <a:endParaRPr lang="en-US" dirty="0">
-              <a:solidFill>
-                <a:srgbClr val="FF0000"/>
-              </a:solidFill>
-            </a:endParaRPr>
-          </a:p>
-          <a:p>
-            <a:pPr marL="228600" indent="-228600">
-              <a:buFont typeface="Arial" panose="020B0604020202020204" pitchFamily="34" charset="0"/>
-              <a:buChar char="•"/>
-            </a:pPr>
-            <a:endParaRPr lang="en-US" sz="2400" dirty="0"/>
-          </a:p>
-          <a:p>
-            <a:pPr marL="228600" indent="-228600">
-              <a:buFont typeface="Arial" panose="020B0604020202020204" pitchFamily="34" charset="0"/>
-              <a:buChar char="•"/>
-            </a:pPr>
-            <a:endParaRPr lang="en-US" sz="2400" dirty="0" smtClean="0"/>
-          </a:p>
-          <a:p>
-            <a:pPr marL="228600" indent="-228600">
-              <a:buFont typeface="Arial" panose="020B0604020202020204" pitchFamily="34" charset="0"/>
-              <a:buChar char="•"/>
-            </a:pPr>
-            <a:endParaRPr lang="en-US" sz="2400" dirty="0" smtClean="0"/>
-          </a:p>
-          <a:p>
-            <a:pPr marL="228600" indent="-228600">
-              <a:buFont typeface="Arial" panose="020B0604020202020204" pitchFamily="34" charset="0"/>
-              <a:buChar char="•"/>
-            </a:pPr>
-            <a:endParaRPr lang="en-US" sz="2600" dirty="0"/>
-          </a:p>
-          <a:p>
-            <a:pPr marL="228600" indent="-228600">
-              <a:buFont typeface="Arial" panose="020B0604020202020204" pitchFamily="34" charset="0"/>
-              <a:buChar char="•"/>
-            </a:pPr>
-            <a:endParaRPr lang="en-US" sz="2400" dirty="0" smtClean="0"/>
-          </a:p>
-          <a:p>
-            <a:pPr marL="685800" lvl="1" indent="-228600">
-              <a:buFont typeface="Arial" panose="020B0604020202020204" pitchFamily="34" charset="0"/>
-              <a:buChar char="•"/>
-            </a:pPr>
-            <a:endParaRPr lang="en-US" sz="2400" dirty="0"/>
-          </a:p>
-          <a:p>
-            <a:pPr marL="228600" indent="-228600">
-              <a:buFont typeface="Arial" panose="020B0604020202020204" pitchFamily="34" charset="0"/>
-              <a:buChar char="•"/>
-            </a:pPr>
-            <a:endParaRPr lang="en-US" dirty="0" smtClean="0"/>
-          </a:p>
-          <a:p>
-            <a:pPr marL="228600" indent="-228600">
-              <a:buFont typeface="Arial" panose="020B0604020202020204" pitchFamily="34" charset="0"/>
-              <a:buChar char="•"/>
-            </a:pPr>
-            <a:endParaRPr lang="en-US" dirty="0"/>
-          </a:p>
-        </p:txBody>
-      </p:sp>
-    </p:spTree>
-    <p:extLst>
-      <p:ext uri="{BB962C8B-B14F-4D97-AF65-F5344CB8AC3E}">
-        <p14:creationId xmlns:p14="http://schemas.microsoft.com/office/powerpoint/2010/main" val="1778762881"/>
-      </p:ext>
-    </p:extLst>
-  </p:cSld>
-  <p:clrMapOvr>
-    <a:masterClrMapping/>
-  </p:clrMapOvr>
-  <p:timing>
-    <p:tnLst>
-      <p:par>
-        <p:cTn id="1" dur="indefinite" restart="never" nodeType="tmRoot">
-          <p:childTnLst>
-            <p:seq concurrent="1" nextAc="seek">
-              <p:cTn id="2" dur="indefinite" nodeType="mainSeq">
-                <p:childTnLst>
-                  <p:par>
-                    <p:cTn id="3" fill="hold">
-                      <p:stCondLst>
-                        <p:cond delay="indefinite"/>
-                      </p:stCondLst>
-                      <p:childTnLst>
-                        <p:par>
-                          <p:cTn id="4" fill="hold">
-                            <p:stCondLst>
-                              <p:cond delay="0"/>
-                            </p:stCondLst>
-                            <p:childTnLst>
-                              <p:par>
-                                <p:cTn id="5" presetID="1" presetClass="entr" presetSubtype="0" fill="hold" nodeType="clickEffect">
-                                  <p:stCondLst>
-                                    <p:cond delay="0"/>
-                                  </p:stCondLst>
-                                  <p:childTnLst>
-                                    <p:set>
-                                      <p:cBhvr>
-                                        <p:cTn id="6" dur="1" fill="hold">
-                                          <p:stCondLst>
-                                            <p:cond delay="0"/>
-                                          </p:stCondLst>
-                                        </p:cTn>
-                                        <p:tgtEl>
-                                          <p:spTgt spid="3">
-                                            <p:txEl>
-                                              <p:pRg st="0" end="0"/>
-                                            </p:txEl>
-                                          </p:spTgt>
-                                        </p:tgtEl>
-                                        <p:attrNameLst>
-                                          <p:attrName>style.visibility</p:attrName>
-                                        </p:attrNameLst>
-                                      </p:cBhvr>
-                                      <p:to>
-                                        <p:strVal val="visible"/>
-                                      </p:to>
-                                    </p:set>
-                                  </p:childTnLst>
-                                </p:cTn>
-                              </p:par>
-                            </p:childTnLst>
-                          </p:cTn>
-                        </p:par>
-                      </p:childTnLst>
-                    </p:cTn>
-                  </p:par>
-                  <p:par>
-                    <p:cTn id="7" fill="hold">
-                      <p:stCondLst>
-                        <p:cond delay="indefinite"/>
-                      </p:stCondLst>
-                      <p:childTnLst>
-                        <p:par>
-                          <p:cTn id="8" fill="hold">
-                            <p:stCondLst>
-                              <p:cond delay="0"/>
-                            </p:stCondLst>
-                            <p:childTnLst>
-                              <p:par>
-                                <p:cTn id="9" presetID="1" presetClass="entr" presetSubtype="0" fill="hold" nodeType="clickEffect">
-                                  <p:stCondLst>
-                                    <p:cond delay="0"/>
-                                  </p:stCondLst>
-                                  <p:childTnLst>
-                                    <p:set>
-                                      <p:cBhvr>
-                                        <p:cTn id="10" dur="1" fill="hold">
-                                          <p:stCondLst>
-                                            <p:cond delay="0"/>
-                                          </p:stCondLst>
-                                        </p:cTn>
-                                        <p:tgtEl>
-                                          <p:spTgt spid="3">
-                                            <p:txEl>
-                                              <p:pRg st="1" end="1"/>
-                                            </p:txEl>
-                                          </p:spTgt>
-                                        </p:tgtEl>
-                                        <p:attrNameLst>
-                                          <p:attrName>style.visibility</p:attrName>
-                                        </p:attrNameLst>
-                                      </p:cBhvr>
-                                      <p:to>
-                                        <p:strVal val="visible"/>
-                                      </p:to>
-                                    </p:set>
-                                  </p:childTnLst>
-                                </p:cTn>
-                              </p:par>
-                            </p:childTnLst>
-                          </p:cTn>
-                        </p:par>
-                      </p:childTnLst>
-                    </p:cTn>
-                  </p:par>
-                  <p:par>
-                    <p:cTn id="11" fill="hold">
-                      <p:stCondLst>
-                        <p:cond delay="indefinite"/>
-                      </p:stCondLst>
-                      <p:childTnLst>
-                        <p:par>
-                          <p:cTn id="12" fill="hold">
-                            <p:stCondLst>
-                              <p:cond delay="0"/>
-                            </p:stCondLst>
-                            <p:childTnLst>
-                              <p:par>
-                                <p:cTn id="13" presetID="1" presetClass="entr" presetSubtype="0" fill="hold" nodeType="clickEffect">
-                                  <p:stCondLst>
-                                    <p:cond delay="0"/>
-                                  </p:stCondLst>
-                                  <p:childTnLst>
-                                    <p:set>
-                                      <p:cBhvr>
-                                        <p:cTn id="14" dur="1" fill="hold">
-                                          <p:stCondLst>
-                                            <p:cond delay="0"/>
-                                          </p:stCondLst>
-                                        </p:cTn>
-                                        <p:tgtEl>
-                                          <p:spTgt spid="3">
-                                            <p:txEl>
-                                              <p:pRg st="2" end="2"/>
-                                            </p:txEl>
-                                          </p:spTgt>
-                                        </p:tgtEl>
-                                        <p:attrNameLst>
-                                          <p:attrName>style.visibility</p:attrName>
-                                        </p:attrNameLst>
-                                      </p:cBhvr>
-                                      <p:to>
-                                        <p:strVal val="visible"/>
-                                      </p:to>
-                                    </p:set>
-                                  </p:childTnLst>
-                                </p:cTn>
-                              </p:par>
-                            </p:childTnLst>
-                          </p:cTn>
-                        </p:par>
-                      </p:childTnLst>
-                    </p:cTn>
-                  </p:par>
-                </p:childTnLst>
-              </p:cTn>
-              <p:prevCondLst>
-                <p:cond evt="onPrev" delay="0">
-                  <p:tgtEl>
-                    <p:sldTgt/>
-                  </p:tgtEl>
-                </p:cond>
-              </p:prevCondLst>
-              <p:nextCondLst>
-                <p:cond evt="onNext" delay="0">
-                  <p:tgtEl>
-                    <p:sldTgt/>
-                  </p:tgtEl>
-                </p:cond>
-              </p:nextCondLst>
-            </p:seq>
-          </p:childTnLst>
-        </p:cTn>
-      </p:par>
-    </p:tnLst>
-  </p:timing>
-</p:sld>
-</file>
-
-<file path=ppt/slides/slide2.xml><?xml version="1.0" encoding="utf-8"?>
-<p:sld xmlns:a="http://schemas.openxmlformats.org/drawingml/2006/main" xmlns:r="http://schemas.openxmlformats.org/officeDocument/2006/relationships" xmlns:p="http://schemas.openxmlformats.org/presentationml/2006/main">
-  <p:cSld>
-    <p:spTree>
-      <p:nvGrpSpPr>
-        <p:cNvPr id="1" name=""/>
-        <p:cNvGrpSpPr/>
-        <p:nvPr/>
-      </p:nvGrpSpPr>
-      <p:grpSpPr>
-        <a:xfrm>
-          <a:off x="0" y="0"/>
-          <a:ext cx="0" cy="0"/>
-          <a:chOff x="0" y="0"/>
-          <a:chExt cx="0" cy="0"/>
-        </a:xfrm>
-      </p:grpSpPr>
-      <p:sp>
-        <p:nvSpPr>
-          <p:cNvPr id="2" name="Title 1"/>
-          <p:cNvSpPr>
-            <a:spLocks noGrp="1"/>
-          </p:cNvSpPr>
-          <p:nvPr>
-            <p:ph type="title"/>
-          </p:nvPr>
-        </p:nvSpPr>
-        <p:spPr/>
-        <p:txBody>
-          <a:bodyPr/>
-          <a:lstStyle/>
-          <a:p>
-            <a:r>
-              <a:rPr lang="en-US" dirty="0" smtClean="0">
-                <a:latin typeface="+mn-lt"/>
-              </a:rPr>
-              <a:t>Agenda</a:t>
-            </a:r>
-            <a:endParaRPr lang="en-US" dirty="0">
-              <a:latin typeface="+mn-lt"/>
-            </a:endParaRPr>
-          </a:p>
-        </p:txBody>
-      </p:sp>
-      <p:sp>
-        <p:nvSpPr>
-          <p:cNvPr id="3" name="Subtitle 2"/>
-          <p:cNvSpPr>
-            <a:spLocks noGrp="1"/>
-          </p:cNvSpPr>
-          <p:nvPr>
-            <p:ph type="subTitle" idx="1"/>
-          </p:nvPr>
-        </p:nvSpPr>
-        <p:spPr>
-          <a:xfrm>
-            <a:off x="573586" y="2011680"/>
-            <a:ext cx="9199063" cy="4060239"/>
-          </a:xfrm>
-        </p:spPr>
-        <p:txBody>
-          <a:bodyPr/>
-          <a:lstStyle/>
-          <a:p>
-            <a:pPr marL="228600" indent="-228600">
-              <a:buFont typeface="Arial" panose="020B0604020202020204" pitchFamily="34" charset="0"/>
-              <a:buChar char="•"/>
-            </a:pPr>
-            <a:r>
-              <a:rPr lang="en-US" sz="2400" dirty="0" smtClean="0"/>
-              <a:t>What is Software Testing</a:t>
-            </a:r>
-          </a:p>
-          <a:p>
-            <a:pPr marL="228600" indent="-228600">
-              <a:buFont typeface="Arial" panose="020B0604020202020204" pitchFamily="34" charset="0"/>
-              <a:buChar char="•"/>
-            </a:pPr>
-            <a:r>
-              <a:rPr lang="en-US" sz="2400" dirty="0" smtClean="0"/>
-              <a:t>White Box vs. Black Box  vs. Grey Box</a:t>
-            </a:r>
-          </a:p>
-          <a:p>
-            <a:pPr marL="228600" indent="-228600">
-              <a:buFont typeface="Arial" panose="020B0604020202020204" pitchFamily="34" charset="0"/>
-              <a:buChar char="•"/>
-            </a:pPr>
-            <a:r>
-              <a:rPr lang="en-US" sz="2400" dirty="0" smtClean="0"/>
-              <a:t>Manual vs. Automated Testing</a:t>
-            </a:r>
-          </a:p>
-          <a:p>
-            <a:pPr marL="228600" indent="-228600">
-              <a:buFont typeface="Arial" panose="020B0604020202020204" pitchFamily="34" charset="0"/>
-              <a:buChar char="•"/>
-            </a:pPr>
-            <a:r>
-              <a:rPr lang="en-US" sz="2400" dirty="0" smtClean="0"/>
-              <a:t>What is Unit Testing?</a:t>
-            </a:r>
-          </a:p>
-          <a:p>
-            <a:pPr marL="228600" indent="-228600">
-              <a:buFont typeface="Arial" panose="020B0604020202020204" pitchFamily="34" charset="0"/>
-              <a:buChar char="•"/>
-            </a:pPr>
-            <a:r>
-              <a:rPr lang="en-US" sz="2400" dirty="0" smtClean="0"/>
-              <a:t>Playing with </a:t>
-            </a:r>
-            <a:r>
-              <a:rPr lang="en-US" sz="2400" dirty="0" err="1" smtClean="0"/>
-              <a:t>NUnit</a:t>
-            </a:r>
-            <a:endParaRPr lang="en-US" sz="2400" dirty="0" smtClean="0"/>
-          </a:p>
-          <a:p>
-            <a:pPr marL="228600" indent="-228600">
-              <a:buFont typeface="Arial" panose="020B0604020202020204" pitchFamily="34" charset="0"/>
-              <a:buChar char="•"/>
-            </a:pPr>
-            <a:r>
-              <a:rPr lang="en-US" sz="2400" dirty="0" smtClean="0"/>
-              <a:t>Dependency Injection</a:t>
-            </a:r>
-          </a:p>
-          <a:p>
-            <a:pPr marL="228600" indent="-228600">
-              <a:buFont typeface="Arial" panose="020B0604020202020204" pitchFamily="34" charset="0"/>
-              <a:buChar char="•"/>
-            </a:pPr>
-            <a:r>
-              <a:rPr lang="en-US" sz="2400" dirty="0" smtClean="0"/>
-              <a:t>Role of Unit Testing in CI/CD</a:t>
-            </a:r>
-          </a:p>
-          <a:p>
-            <a:pPr marL="228600" indent="-228600">
-              <a:buFont typeface="Arial" panose="020B0604020202020204" pitchFamily="34" charset="0"/>
-              <a:buChar char="•"/>
-            </a:pPr>
-            <a:r>
-              <a:rPr lang="en-US" sz="2400" dirty="0" smtClean="0"/>
-              <a:t>What is next?</a:t>
-            </a:r>
-          </a:p>
-          <a:p>
-            <a:pPr marL="228600" indent="-228600">
-              <a:buFont typeface="Arial" panose="020B0604020202020204" pitchFamily="34" charset="0"/>
-              <a:buChar char="•"/>
-            </a:pPr>
-            <a:endParaRPr lang="en-US" dirty="0" smtClean="0"/>
-          </a:p>
-          <a:p>
-            <a:pPr marL="228600" indent="-228600">
-              <a:buFont typeface="Arial" panose="020B0604020202020204" pitchFamily="34" charset="0"/>
-              <a:buChar char="•"/>
-            </a:pPr>
-            <a:endParaRPr lang="en-US" dirty="0"/>
-          </a:p>
-        </p:txBody>
-      </p:sp>
-    </p:spTree>
-    <p:extLst>
-      <p:ext uri="{BB962C8B-B14F-4D97-AF65-F5344CB8AC3E}">
-        <p14:creationId xmlns:p14="http://schemas.microsoft.com/office/powerpoint/2010/main" val="3639720695"/>
-      </p:ext>
-    </p:extLst>
-  </p:cSld>
-  <p:clrMapOvr>
-    <a:masterClrMapping/>
-  </p:clrMapOvr>
-  <p:timing>
-    <p:tnLst>
-      <p:par>
-        <p:cTn id="1" dur="indefinite" restart="never" nodeType="tmRoot">
-          <p:childTnLst>
-            <p:seq concurrent="1" nextAc="seek">
-              <p:cTn id="2" dur="indefinite" nodeType="mainSeq">
-                <p:childTnLst>
-                  <p:par>
-                    <p:cTn id="3" fill="hold">
-                      <p:stCondLst>
-                        <p:cond delay="indefinite"/>
-                      </p:stCondLst>
-                      <p:childTnLst>
-                        <p:par>
-                          <p:cTn id="4" fill="hold">
-                            <p:stCondLst>
-                              <p:cond delay="0"/>
-                            </p:stCondLst>
-                            <p:childTnLst>
-                              <p:par>
-                                <p:cTn id="5" presetID="1" presetClass="entr" presetSubtype="0" fill="hold" grpId="0" nodeType="clickEffect">
-                                  <p:stCondLst>
-                                    <p:cond delay="0"/>
-                                  </p:stCondLst>
-                                  <p:childTnLst>
-                                    <p:set>
-                                      <p:cBhvr>
-                                        <p:cTn id="6" dur="1" fill="hold">
-                                          <p:stCondLst>
-                                            <p:cond delay="0"/>
-                                          </p:stCondLst>
-                                        </p:cTn>
-                                        <p:tgtEl>
-                                          <p:spTgt spid="3">
-                                            <p:txEl>
-                                              <p:pRg st="0" end="0"/>
-                                            </p:txEl>
-                                          </p:spTgt>
-                                        </p:tgtEl>
-                                        <p:attrNameLst>
-                                          <p:attrName>style.visibility</p:attrName>
-                                        </p:attrNameLst>
-                                      </p:cBhvr>
-                                      <p:to>
-                                        <p:strVal val="visible"/>
-                                      </p:to>
-                                    </p:set>
-                                  </p:childTnLst>
-                                </p:cTn>
-                              </p:par>
-                            </p:childTnLst>
-                          </p:cTn>
-                        </p:par>
-                      </p:childTnLst>
-                    </p:cTn>
-                  </p:par>
-                  <p:par>
-                    <p:cTn id="7" fill="hold">
-                      <p:stCondLst>
-                        <p:cond delay="indefinite"/>
-                      </p:stCondLst>
-                      <p:childTnLst>
-                        <p:par>
-                          <p:cTn id="8" fill="hold">
-                            <p:stCondLst>
-                              <p:cond delay="0"/>
-                            </p:stCondLst>
-                            <p:childTnLst>
-                              <p:par>
-                                <p:cTn id="9" presetID="1" presetClass="entr" presetSubtype="0" fill="hold" grpId="0" nodeType="clickEffect">
-                                  <p:stCondLst>
-                                    <p:cond delay="0"/>
-                                  </p:stCondLst>
-                                  <p:childTnLst>
-                                    <p:set>
-                                      <p:cBhvr>
-                                        <p:cTn id="10" dur="1" fill="hold">
-                                          <p:stCondLst>
-                                            <p:cond delay="0"/>
-                                          </p:stCondLst>
-                                        </p:cTn>
-                                        <p:tgtEl>
-                                          <p:spTgt spid="3">
-                                            <p:txEl>
-                                              <p:pRg st="1" end="1"/>
-                                            </p:txEl>
-                                          </p:spTgt>
-                                        </p:tgtEl>
-                                        <p:attrNameLst>
-                                          <p:attrName>style.visibility</p:attrName>
-                                        </p:attrNameLst>
-                                      </p:cBhvr>
-                                      <p:to>
-                                        <p:strVal val="visible"/>
-                                      </p:to>
-                                    </p:set>
-                                  </p:childTnLst>
-                                </p:cTn>
-                              </p:par>
-                            </p:childTnLst>
-                          </p:cTn>
-                        </p:par>
-                      </p:childTnLst>
-                    </p:cTn>
-                  </p:par>
-                  <p:par>
-                    <p:cTn id="11" fill="hold">
-                      <p:stCondLst>
-                        <p:cond delay="indefinite"/>
-                      </p:stCondLst>
-                      <p:childTnLst>
-                        <p:par>
-                          <p:cTn id="12" fill="hold">
-                            <p:stCondLst>
-                              <p:cond delay="0"/>
-                            </p:stCondLst>
-                            <p:childTnLst>
-                              <p:par>
-                                <p:cTn id="13" presetID="1" presetClass="entr" presetSubtype="0" fill="hold" grpId="0" nodeType="clickEffect">
-                                  <p:stCondLst>
-                                    <p:cond delay="0"/>
-                                  </p:stCondLst>
-                                  <p:childTnLst>
-                                    <p:set>
-                                      <p:cBhvr>
-                                        <p:cTn id="14" dur="1" fill="hold">
-                                          <p:stCondLst>
-                                            <p:cond delay="0"/>
-                                          </p:stCondLst>
-                                        </p:cTn>
-                                        <p:tgtEl>
-                                          <p:spTgt spid="3">
-                                            <p:txEl>
-                                              <p:pRg st="2" end="2"/>
-                                            </p:txEl>
-                                          </p:spTgt>
-                                        </p:tgtEl>
-                                        <p:attrNameLst>
-                                          <p:attrName>style.visibility</p:attrName>
-                                        </p:attrNameLst>
-                                      </p:cBhvr>
-                                      <p:to>
-                                        <p:strVal val="visible"/>
-                                      </p:to>
-                                    </p:set>
-                                  </p:childTnLst>
-                                </p:cTn>
-                              </p:par>
-                            </p:childTnLst>
-                          </p:cTn>
-                        </p:par>
-                      </p:childTnLst>
-                    </p:cTn>
-                  </p:par>
-                  <p:par>
-                    <p:cTn id="15" fill="hold">
-                      <p:stCondLst>
-                        <p:cond delay="indefinite"/>
-                      </p:stCondLst>
-                      <p:childTnLst>
-                        <p:par>
-                          <p:cTn id="16" fill="hold">
-                            <p:stCondLst>
-                              <p:cond delay="0"/>
-                            </p:stCondLst>
-                            <p:childTnLst>
-                              <p:par>
-                                <p:cTn id="17" presetID="1" presetClass="entr" presetSubtype="0" fill="hold" grpId="0" nodeType="clickEffect">
-                                  <p:stCondLst>
-                                    <p:cond delay="0"/>
-                                  </p:stCondLst>
-                                  <p:childTnLst>
-                                    <p:set>
-                                      <p:cBhvr>
-                                        <p:cTn id="18" dur="1" fill="hold">
-                                          <p:stCondLst>
-                                            <p:cond delay="0"/>
-                                          </p:stCondLst>
-                                        </p:cTn>
-                                        <p:tgtEl>
-                                          <p:spTgt spid="3">
-                                            <p:txEl>
-                                              <p:pRg st="3" end="3"/>
-                                            </p:txEl>
-                                          </p:spTgt>
-                                        </p:tgtEl>
-                                        <p:attrNameLst>
-                                          <p:attrName>style.visibility</p:attrName>
-                                        </p:attrNameLst>
-                                      </p:cBhvr>
-                                      <p:to>
-                                        <p:strVal val="visible"/>
-                                      </p:to>
-                                    </p:set>
-                                  </p:childTnLst>
-                                </p:cTn>
-                              </p:par>
-                            </p:childTnLst>
-                          </p:cTn>
-                        </p:par>
-                      </p:childTnLst>
-                    </p:cTn>
-                  </p:par>
-                  <p:par>
-                    <p:cTn id="19" fill="hold">
-                      <p:stCondLst>
-                        <p:cond delay="indefinite"/>
-                      </p:stCondLst>
-                      <p:childTnLst>
-                        <p:par>
-                          <p:cTn id="20" fill="hold">
-                            <p:stCondLst>
-                              <p:cond delay="0"/>
-                            </p:stCondLst>
-                            <p:childTnLst>
-                              <p:par>
-                                <p:cTn id="21" presetID="1" presetClass="entr" presetSubtype="0" fill="hold" grpId="0" nodeType="clickEffect">
-                                  <p:stCondLst>
-                                    <p:cond delay="0"/>
-                                  </p:stCondLst>
-                                  <p:childTnLst>
-                                    <p:set>
-                                      <p:cBhvr>
-                                        <p:cTn id="22" dur="1" fill="hold">
-                                          <p:stCondLst>
-                                            <p:cond delay="0"/>
-                                          </p:stCondLst>
-                                        </p:cTn>
-                                        <p:tgtEl>
-                                          <p:spTgt spid="3">
-                                            <p:txEl>
-                                              <p:pRg st="4" end="4"/>
-                                            </p:txEl>
-                                          </p:spTgt>
-                                        </p:tgtEl>
-                                        <p:attrNameLst>
-                                          <p:attrName>style.visibility</p:attrName>
-                                        </p:attrNameLst>
-                                      </p:cBhvr>
-                                      <p:to>
-                                        <p:strVal val="visible"/>
-                                      </p:to>
-                                    </p:set>
-                                  </p:childTnLst>
-                                </p:cTn>
-                              </p:par>
-                            </p:childTnLst>
-                          </p:cTn>
-                        </p:par>
-                      </p:childTnLst>
-                    </p:cTn>
-                  </p:par>
-                  <p:par>
-                    <p:cTn id="23" fill="hold">
-                      <p:stCondLst>
-                        <p:cond delay="indefinite"/>
-                      </p:stCondLst>
-                      <p:childTnLst>
-                        <p:par>
-                          <p:cTn id="24" fill="hold">
-                            <p:stCondLst>
-                              <p:cond delay="0"/>
-                            </p:stCondLst>
-                            <p:childTnLst>
-                              <p:par>
-                                <p:cTn id="25" presetID="1" presetClass="entr" presetSubtype="0" fill="hold" grpId="0" nodeType="clickEffect">
-                                  <p:stCondLst>
-                                    <p:cond delay="0"/>
-                                  </p:stCondLst>
-                                  <p:childTnLst>
-                                    <p:set>
-                                      <p:cBhvr>
-                                        <p:cTn id="26" dur="1" fill="hold">
-                                          <p:stCondLst>
-                                            <p:cond delay="0"/>
-                                          </p:stCondLst>
-                                        </p:cTn>
-                                        <p:tgtEl>
-                                          <p:spTgt spid="3">
-                                            <p:txEl>
-                                              <p:pRg st="5" end="5"/>
-                                            </p:txEl>
-                                          </p:spTgt>
-                                        </p:tgtEl>
-                                        <p:attrNameLst>
-                                          <p:attrName>style.visibility</p:attrName>
-                                        </p:attrNameLst>
-                                      </p:cBhvr>
-                                      <p:to>
-                                        <p:strVal val="visible"/>
-                                      </p:to>
-                                    </p:set>
-                                  </p:childTnLst>
-                                </p:cTn>
-                              </p:par>
-                            </p:childTnLst>
-                          </p:cTn>
-                        </p:par>
-                      </p:childTnLst>
-                    </p:cTn>
-                  </p:par>
-                  <p:par>
-                    <p:cTn id="27" fill="hold">
-                      <p:stCondLst>
-                        <p:cond delay="indefinite"/>
-                      </p:stCondLst>
-                      <p:childTnLst>
-                        <p:par>
-                          <p:cTn id="28" fill="hold">
-                            <p:stCondLst>
-                              <p:cond delay="0"/>
-                            </p:stCondLst>
-                            <p:childTnLst>
-                              <p:par>
-                                <p:cTn id="29" presetID="1" presetClass="entr" presetSubtype="0" fill="hold" grpId="0" nodeType="clickEffect">
-                                  <p:stCondLst>
-                                    <p:cond delay="0"/>
-                                  </p:stCondLst>
-                                  <p:childTnLst>
-                                    <p:set>
-                                      <p:cBhvr>
-                                        <p:cTn id="30" dur="1" fill="hold">
-                                          <p:stCondLst>
-                                            <p:cond delay="0"/>
-                                          </p:stCondLst>
-                                        </p:cTn>
-                                        <p:tgtEl>
-                                          <p:spTgt spid="3">
-                                            <p:txEl>
-                                              <p:pRg st="6" end="6"/>
-                                            </p:txEl>
-                                          </p:spTgt>
-                                        </p:tgtEl>
-                                        <p:attrNameLst>
-                                          <p:attrName>style.visibility</p:attrName>
-                                        </p:attrNameLst>
-                                      </p:cBhvr>
-                                      <p:to>
-                                        <p:strVal val="visible"/>
-                                      </p:to>
-                                    </p:set>
-                                  </p:childTnLst>
-                                </p:cTn>
-                              </p:par>
-                            </p:childTnLst>
-                          </p:cTn>
-                        </p:par>
-                      </p:childTnLst>
-                    </p:cTn>
-                  </p:par>
-                  <p:par>
-                    <p:cTn id="31" fill="hold">
-                      <p:stCondLst>
-                        <p:cond delay="indefinite"/>
-                      </p:stCondLst>
-                      <p:childTnLst>
-                        <p:par>
-                          <p:cTn id="32" fill="hold">
-                            <p:stCondLst>
-                              <p:cond delay="0"/>
-                            </p:stCondLst>
-                            <p:childTnLst>
-                              <p:par>
-                                <p:cTn id="33" presetID="1" presetClass="entr" presetSubtype="0" fill="hold" grpId="0" nodeType="clickEffect">
-                                  <p:stCondLst>
-                                    <p:cond delay="0"/>
-                                  </p:stCondLst>
-                                  <p:childTnLst>
-                                    <p:set>
-                                      <p:cBhvr>
-                                        <p:cTn id="34" dur="1" fill="hold">
-                                          <p:stCondLst>
-                                            <p:cond delay="0"/>
-                                          </p:stCondLst>
-                                        </p:cTn>
-                                        <p:tgtEl>
-                                          <p:spTgt spid="3">
-                                            <p:txEl>
-                                              <p:pRg st="7" end="7"/>
-                                            </p:txEl>
-                                          </p:spTgt>
-                                        </p:tgtEl>
-                                        <p:attrNameLst>
-                                          <p:attrName>style.visibility</p:attrName>
-                                        </p:attrNameLst>
-                                      </p:cBhvr>
-                                      <p:to>
-                                        <p:strVal val="visible"/>
-                                      </p:to>
-                                    </p:set>
-                                  </p:childTnLst>
-                                </p:cTn>
-                              </p:par>
-                            </p:childTnLst>
-                          </p:cTn>
-                        </p:par>
-                      </p:childTnLst>
-                    </p:cTn>
-                  </p:par>
-                </p:childTnLst>
-              </p:cTn>
-              <p:prevCondLst>
-                <p:cond evt="onPrev" delay="0">
-                  <p:tgtEl>
-                    <p:sldTgt/>
-                  </p:tgtEl>
-                </p:cond>
-              </p:prevCondLst>
-              <p:nextCondLst>
-                <p:cond evt="onNext" delay="0">
-                  <p:tgtEl>
-                    <p:sldTgt/>
-                  </p:tgtEl>
-                </p:cond>
-              </p:nextCondLst>
-            </p:seq>
-          </p:childTnLst>
-        </p:cTn>
-      </p:par>
-    </p:tnLst>
-    <p:bldLst>
-      <p:bldP spid="3" grpId="0" build="p"/>
-    </p:bldLst>
-  </p:timing>
-</p:sld>
-</file>
-
-<file path=ppt/slides/slide20.xml><?xml version="1.0" encoding="utf-8"?>
+<file path=ppt/slides/slide18.xml><?xml version="1.0" encoding="utf-8"?>
 <p:sld xmlns:a="http://schemas.openxmlformats.org/drawingml/2006/main" xmlns:r="http://schemas.openxmlformats.org/officeDocument/2006/relationships" xmlns:p="http://schemas.openxmlformats.org/presentationml/2006/main">
   <p:cSld>
     <p:spTree>
@@ -11555,787 +9241,7 @@
 </p:sld>
 </file>
 
-<file path=ppt/slides/slide21.xml><?xml version="1.0" encoding="utf-8"?>
-<p:sld xmlns:a="http://schemas.openxmlformats.org/drawingml/2006/main" xmlns:r="http://schemas.openxmlformats.org/officeDocument/2006/relationships" xmlns:p="http://schemas.openxmlformats.org/presentationml/2006/main">
-  <p:cSld>
-    <p:spTree>
-      <p:nvGrpSpPr>
-        <p:cNvPr id="1" name=""/>
-        <p:cNvGrpSpPr/>
-        <p:nvPr/>
-      </p:nvGrpSpPr>
-      <p:grpSpPr>
-        <a:xfrm>
-          <a:off x="0" y="0"/>
-          <a:ext cx="0" cy="0"/>
-          <a:chOff x="0" y="0"/>
-          <a:chExt cx="0" cy="0"/>
-        </a:xfrm>
-      </p:grpSpPr>
-      <p:sp>
-        <p:nvSpPr>
-          <p:cNvPr id="2" name="Title 1"/>
-          <p:cNvSpPr>
-            <a:spLocks noGrp="1"/>
-          </p:cNvSpPr>
-          <p:nvPr>
-            <p:ph type="title"/>
-          </p:nvPr>
-        </p:nvSpPr>
-        <p:spPr/>
-        <p:txBody>
-          <a:bodyPr/>
-          <a:lstStyle/>
-          <a:p>
-            <a:r>
-              <a:rPr lang="en-US" dirty="0" smtClean="0"/>
-              <a:t>Demo 4</a:t>
-            </a:r>
-            <a:endParaRPr lang="en-US" dirty="0">
-              <a:latin typeface="+mn-lt"/>
-            </a:endParaRPr>
-          </a:p>
-        </p:txBody>
-      </p:sp>
-      <p:sp>
-        <p:nvSpPr>
-          <p:cNvPr id="3" name="Subtitle 2"/>
-          <p:cNvSpPr>
-            <a:spLocks noGrp="1"/>
-          </p:cNvSpPr>
-          <p:nvPr>
-            <p:ph type="subTitle" idx="1"/>
-          </p:nvPr>
-        </p:nvSpPr>
-        <p:spPr>
-          <a:xfrm>
-            <a:off x="573586" y="2011680"/>
-            <a:ext cx="9199063" cy="4060239"/>
-          </a:xfrm>
-        </p:spPr>
-        <p:txBody>
-          <a:bodyPr/>
-          <a:lstStyle/>
-          <a:p>
-            <a:pPr marL="228600" indent="-228600">
-              <a:buFont typeface="Arial" panose="020B0604020202020204" pitchFamily="34" charset="0"/>
-              <a:buChar char="•"/>
-            </a:pPr>
-            <a:r>
-              <a:rPr lang="en-US" sz="2400" dirty="0"/>
-              <a:t>Open </a:t>
-            </a:r>
-            <a:r>
-              <a:rPr lang="en-US" sz="2400" dirty="0" smtClean="0">
-                <a:solidFill>
-                  <a:srgbClr val="FF0000"/>
-                </a:solidFill>
-              </a:rPr>
-              <a:t>Sample3</a:t>
-            </a:r>
-            <a:r>
-              <a:rPr lang="en-US" sz="2400" dirty="0" smtClean="0"/>
-              <a:t> </a:t>
-            </a:r>
-            <a:r>
-              <a:rPr lang="en-US" sz="2400" dirty="0"/>
-              <a:t>-&gt; </a:t>
-            </a:r>
-            <a:r>
-              <a:rPr lang="en-US" sz="2400" dirty="0" smtClean="0"/>
-              <a:t>MainConsoleApp.sln</a:t>
-            </a:r>
-          </a:p>
-          <a:p>
-            <a:pPr marL="228600" indent="-228600">
-              <a:buFont typeface="Arial" panose="020B0604020202020204" pitchFamily="34" charset="0"/>
-              <a:buChar char="•"/>
-            </a:pPr>
-            <a:r>
-              <a:rPr lang="en-US" sz="2400" dirty="0" smtClean="0"/>
-              <a:t>Change </a:t>
-            </a:r>
-            <a:r>
-              <a:rPr lang="en-US" sz="2400" dirty="0" err="1" smtClean="0"/>
-              <a:t>AppHelper</a:t>
-            </a:r>
-            <a:r>
-              <a:rPr lang="en-US" sz="2400" dirty="0" smtClean="0"/>
-              <a:t> -&gt; </a:t>
-            </a:r>
-            <a:r>
-              <a:rPr lang="en-US" sz="2400" dirty="0" err="1" smtClean="0"/>
-              <a:t>MagicHelper</a:t>
-            </a:r>
-            <a:r>
-              <a:rPr lang="en-US" sz="2400" dirty="0" smtClean="0"/>
-              <a:t> Logic so that “dependency” can be injected from outside world.</a:t>
-            </a:r>
-          </a:p>
-          <a:p>
-            <a:pPr lvl="1" algn="l"/>
-            <a:endParaRPr lang="en-US" dirty="0">
-              <a:solidFill>
-                <a:srgbClr val="FF0000"/>
-              </a:solidFill>
-            </a:endParaRPr>
-          </a:p>
-          <a:p>
-            <a:pPr marL="228600" indent="-228600">
-              <a:buFont typeface="Arial" panose="020B0604020202020204" pitchFamily="34" charset="0"/>
-              <a:buChar char="•"/>
-            </a:pPr>
-            <a:endParaRPr lang="en-US" sz="2400" dirty="0"/>
-          </a:p>
-          <a:p>
-            <a:pPr marL="228600" indent="-228600">
-              <a:buFont typeface="Arial" panose="020B0604020202020204" pitchFamily="34" charset="0"/>
-              <a:buChar char="•"/>
-            </a:pPr>
-            <a:endParaRPr lang="en-US" sz="2400" dirty="0" smtClean="0"/>
-          </a:p>
-          <a:p>
-            <a:pPr marL="228600" indent="-228600">
-              <a:buFont typeface="Arial" panose="020B0604020202020204" pitchFamily="34" charset="0"/>
-              <a:buChar char="•"/>
-            </a:pPr>
-            <a:endParaRPr lang="en-US" sz="2400" dirty="0" smtClean="0"/>
-          </a:p>
-          <a:p>
-            <a:pPr marL="228600" indent="-228600">
-              <a:buFont typeface="Arial" panose="020B0604020202020204" pitchFamily="34" charset="0"/>
-              <a:buChar char="•"/>
-            </a:pPr>
-            <a:endParaRPr lang="en-US" sz="2600" dirty="0"/>
-          </a:p>
-          <a:p>
-            <a:pPr marL="228600" indent="-228600">
-              <a:buFont typeface="Arial" panose="020B0604020202020204" pitchFamily="34" charset="0"/>
-              <a:buChar char="•"/>
-            </a:pPr>
-            <a:endParaRPr lang="en-US" sz="2400" dirty="0" smtClean="0"/>
-          </a:p>
-          <a:p>
-            <a:pPr marL="685800" lvl="1" indent="-228600">
-              <a:buFont typeface="Arial" panose="020B0604020202020204" pitchFamily="34" charset="0"/>
-              <a:buChar char="•"/>
-            </a:pPr>
-            <a:endParaRPr lang="en-US" sz="2400" dirty="0"/>
-          </a:p>
-          <a:p>
-            <a:pPr marL="228600" indent="-228600">
-              <a:buFont typeface="Arial" panose="020B0604020202020204" pitchFamily="34" charset="0"/>
-              <a:buChar char="•"/>
-            </a:pPr>
-            <a:endParaRPr lang="en-US" dirty="0" smtClean="0"/>
-          </a:p>
-          <a:p>
-            <a:pPr marL="228600" indent="-228600">
-              <a:buFont typeface="Arial" panose="020B0604020202020204" pitchFamily="34" charset="0"/>
-              <a:buChar char="•"/>
-            </a:pPr>
-            <a:endParaRPr lang="en-US" dirty="0"/>
-          </a:p>
-        </p:txBody>
-      </p:sp>
-    </p:spTree>
-    <p:extLst>
-      <p:ext uri="{BB962C8B-B14F-4D97-AF65-F5344CB8AC3E}">
-        <p14:creationId xmlns:p14="http://schemas.microsoft.com/office/powerpoint/2010/main" val="1559629027"/>
-      </p:ext>
-    </p:extLst>
-  </p:cSld>
-  <p:clrMapOvr>
-    <a:masterClrMapping/>
-  </p:clrMapOvr>
-  <p:timing>
-    <p:tnLst>
-      <p:par>
-        <p:cTn id="1" dur="indefinite" restart="never" nodeType="tmRoot">
-          <p:childTnLst>
-            <p:seq concurrent="1" nextAc="seek">
-              <p:cTn id="2" dur="indefinite" nodeType="mainSeq">
-                <p:childTnLst>
-                  <p:par>
-                    <p:cTn id="3" fill="hold">
-                      <p:stCondLst>
-                        <p:cond delay="indefinite"/>
-                      </p:stCondLst>
-                      <p:childTnLst>
-                        <p:par>
-                          <p:cTn id="4" fill="hold">
-                            <p:stCondLst>
-                              <p:cond delay="0"/>
-                            </p:stCondLst>
-                            <p:childTnLst>
-                              <p:par>
-                                <p:cTn id="5" presetID="1" presetClass="entr" presetSubtype="0" fill="hold" nodeType="clickEffect">
-                                  <p:stCondLst>
-                                    <p:cond delay="0"/>
-                                  </p:stCondLst>
-                                  <p:childTnLst>
-                                    <p:set>
-                                      <p:cBhvr>
-                                        <p:cTn id="6" dur="1" fill="hold">
-                                          <p:stCondLst>
-                                            <p:cond delay="0"/>
-                                          </p:stCondLst>
-                                        </p:cTn>
-                                        <p:tgtEl>
-                                          <p:spTgt spid="3">
-                                            <p:txEl>
-                                              <p:pRg st="0" end="0"/>
-                                            </p:txEl>
-                                          </p:spTgt>
-                                        </p:tgtEl>
-                                        <p:attrNameLst>
-                                          <p:attrName>style.visibility</p:attrName>
-                                        </p:attrNameLst>
-                                      </p:cBhvr>
-                                      <p:to>
-                                        <p:strVal val="visible"/>
-                                      </p:to>
-                                    </p:set>
-                                  </p:childTnLst>
-                                </p:cTn>
-                              </p:par>
-                            </p:childTnLst>
-                          </p:cTn>
-                        </p:par>
-                      </p:childTnLst>
-                    </p:cTn>
-                  </p:par>
-                  <p:par>
-                    <p:cTn id="7" fill="hold">
-                      <p:stCondLst>
-                        <p:cond delay="indefinite"/>
-                      </p:stCondLst>
-                      <p:childTnLst>
-                        <p:par>
-                          <p:cTn id="8" fill="hold">
-                            <p:stCondLst>
-                              <p:cond delay="0"/>
-                            </p:stCondLst>
-                            <p:childTnLst>
-                              <p:par>
-                                <p:cTn id="9" presetID="1" presetClass="entr" presetSubtype="0" fill="hold" nodeType="clickEffect">
-                                  <p:stCondLst>
-                                    <p:cond delay="0"/>
-                                  </p:stCondLst>
-                                  <p:childTnLst>
-                                    <p:set>
-                                      <p:cBhvr>
-                                        <p:cTn id="10" dur="1" fill="hold">
-                                          <p:stCondLst>
-                                            <p:cond delay="0"/>
-                                          </p:stCondLst>
-                                        </p:cTn>
-                                        <p:tgtEl>
-                                          <p:spTgt spid="3">
-                                            <p:txEl>
-                                              <p:pRg st="1" end="1"/>
-                                            </p:txEl>
-                                          </p:spTgt>
-                                        </p:tgtEl>
-                                        <p:attrNameLst>
-                                          <p:attrName>style.visibility</p:attrName>
-                                        </p:attrNameLst>
-                                      </p:cBhvr>
-                                      <p:to>
-                                        <p:strVal val="visible"/>
-                                      </p:to>
-                                    </p:set>
-                                  </p:childTnLst>
-                                </p:cTn>
-                              </p:par>
-                            </p:childTnLst>
-                          </p:cTn>
-                        </p:par>
-                      </p:childTnLst>
-                    </p:cTn>
-                  </p:par>
-                </p:childTnLst>
-              </p:cTn>
-              <p:prevCondLst>
-                <p:cond evt="onPrev" delay="0">
-                  <p:tgtEl>
-                    <p:sldTgt/>
-                  </p:tgtEl>
-                </p:cond>
-              </p:prevCondLst>
-              <p:nextCondLst>
-                <p:cond evt="onNext" delay="0">
-                  <p:tgtEl>
-                    <p:sldTgt/>
-                  </p:tgtEl>
-                </p:cond>
-              </p:nextCondLst>
-            </p:seq>
-          </p:childTnLst>
-        </p:cTn>
-      </p:par>
-    </p:tnLst>
-  </p:timing>
-</p:sld>
-</file>
-
-<file path=ppt/slides/slide22.xml><?xml version="1.0" encoding="utf-8"?>
-<p:sld xmlns:a="http://schemas.openxmlformats.org/drawingml/2006/main" xmlns:r="http://schemas.openxmlformats.org/officeDocument/2006/relationships" xmlns:p="http://schemas.openxmlformats.org/presentationml/2006/main">
-  <p:cSld>
-    <p:spTree>
-      <p:nvGrpSpPr>
-        <p:cNvPr id="1" name=""/>
-        <p:cNvGrpSpPr/>
-        <p:nvPr/>
-      </p:nvGrpSpPr>
-      <p:grpSpPr>
-        <a:xfrm>
-          <a:off x="0" y="0"/>
-          <a:ext cx="0" cy="0"/>
-          <a:chOff x="0" y="0"/>
-          <a:chExt cx="0" cy="0"/>
-        </a:xfrm>
-      </p:grpSpPr>
-      <p:sp>
-        <p:nvSpPr>
-          <p:cNvPr id="2" name="Title 1"/>
-          <p:cNvSpPr>
-            <a:spLocks noGrp="1"/>
-          </p:cNvSpPr>
-          <p:nvPr>
-            <p:ph type="title"/>
-          </p:nvPr>
-        </p:nvSpPr>
-        <p:spPr/>
-        <p:txBody>
-          <a:bodyPr/>
-          <a:lstStyle/>
-          <a:p>
-            <a:r>
-              <a:rPr lang="en-US" dirty="0" smtClean="0"/>
-              <a:t>Demo 4 - Solution</a:t>
-            </a:r>
-            <a:endParaRPr lang="en-US" dirty="0">
-              <a:latin typeface="+mn-lt"/>
-            </a:endParaRPr>
-          </a:p>
-        </p:txBody>
-      </p:sp>
-      <p:sp>
-        <p:nvSpPr>
-          <p:cNvPr id="3" name="Subtitle 2"/>
-          <p:cNvSpPr>
-            <a:spLocks noGrp="1"/>
-          </p:cNvSpPr>
-          <p:nvPr>
-            <p:ph type="subTitle" idx="1"/>
-          </p:nvPr>
-        </p:nvSpPr>
-        <p:spPr>
-          <a:xfrm>
-            <a:off x="573586" y="2011680"/>
-            <a:ext cx="9199063" cy="4245685"/>
-          </a:xfrm>
-        </p:spPr>
-        <p:txBody>
-          <a:bodyPr/>
-          <a:lstStyle/>
-          <a:p>
-            <a:pPr marL="228600" indent="-228600">
-              <a:buFont typeface="Arial" panose="020B0604020202020204" pitchFamily="34" charset="0"/>
-              <a:buChar char="•"/>
-            </a:pPr>
-            <a:r>
-              <a:rPr lang="en-US" sz="2400" dirty="0"/>
-              <a:t>Open </a:t>
-            </a:r>
-            <a:r>
-              <a:rPr lang="en-US" sz="2400" dirty="0" smtClean="0">
-                <a:solidFill>
-                  <a:srgbClr val="FF0000"/>
-                </a:solidFill>
-              </a:rPr>
-              <a:t>Sample4</a:t>
-            </a:r>
-            <a:r>
-              <a:rPr lang="en-US" sz="2400" dirty="0" smtClean="0"/>
-              <a:t> </a:t>
-            </a:r>
-            <a:r>
-              <a:rPr lang="en-US" sz="2400" dirty="0"/>
-              <a:t>-&gt; MainConsoleApp.sln</a:t>
-            </a:r>
-          </a:p>
-          <a:p>
-            <a:pPr marL="228600" indent="-228600">
-              <a:buFont typeface="Arial" panose="020B0604020202020204" pitchFamily="34" charset="0"/>
-              <a:buChar char="•"/>
-            </a:pPr>
-            <a:r>
-              <a:rPr lang="en-US" sz="2400" dirty="0" smtClean="0"/>
-              <a:t>Rebuild the Solution</a:t>
-            </a:r>
-          </a:p>
-          <a:p>
-            <a:pPr marL="228600" indent="-228600">
-              <a:buFont typeface="Arial" panose="020B0604020202020204" pitchFamily="34" charset="0"/>
-              <a:buChar char="•"/>
-            </a:pPr>
-            <a:r>
-              <a:rPr lang="en-US" sz="2400" dirty="0" smtClean="0"/>
-              <a:t>Check </a:t>
-            </a:r>
-            <a:r>
-              <a:rPr lang="en-US" sz="2400" dirty="0" err="1" smtClean="0"/>
-              <a:t>AppHelper</a:t>
-            </a:r>
-            <a:r>
-              <a:rPr lang="en-US" sz="2400" dirty="0" smtClean="0"/>
-              <a:t> -&gt; </a:t>
-            </a:r>
-            <a:r>
-              <a:rPr lang="en-US" sz="2400" dirty="0" err="1" smtClean="0"/>
-              <a:t>MagicHelper.cs</a:t>
-            </a:r>
-            <a:r>
-              <a:rPr lang="en-US" sz="2400" dirty="0" smtClean="0"/>
-              <a:t> file</a:t>
-            </a:r>
-          </a:p>
-          <a:p>
-            <a:pPr marL="228600" indent="-228600">
-              <a:buFont typeface="Arial" panose="020B0604020202020204" pitchFamily="34" charset="0"/>
-              <a:buChar char="•"/>
-            </a:pPr>
-            <a:r>
-              <a:rPr lang="en-US" sz="2400" dirty="0" smtClean="0"/>
-              <a:t>Check and play with </a:t>
-            </a:r>
-            <a:r>
-              <a:rPr lang="en-US" sz="2400" dirty="0" err="1" smtClean="0"/>
-              <a:t>AppBAL.Tests</a:t>
-            </a:r>
-            <a:r>
-              <a:rPr lang="en-US" sz="2400" dirty="0" smtClean="0"/>
-              <a:t> Project</a:t>
-            </a:r>
-          </a:p>
-          <a:p>
-            <a:endParaRPr lang="en-US" sz="2400" dirty="0" smtClean="0"/>
-          </a:p>
-          <a:p>
-            <a:pPr marL="228600" indent="-228600">
-              <a:buFont typeface="Arial" panose="020B0604020202020204" pitchFamily="34" charset="0"/>
-              <a:buChar char="•"/>
-            </a:pPr>
-            <a:endParaRPr lang="en-US" sz="2400" dirty="0" smtClean="0"/>
-          </a:p>
-          <a:p>
-            <a:pPr lvl="1" algn="l"/>
-            <a:endParaRPr lang="en-US" dirty="0">
-              <a:solidFill>
-                <a:srgbClr val="FF0000"/>
-              </a:solidFill>
-            </a:endParaRPr>
-          </a:p>
-          <a:p>
-            <a:pPr marL="228600" indent="-228600">
-              <a:buFont typeface="Arial" panose="020B0604020202020204" pitchFamily="34" charset="0"/>
-              <a:buChar char="•"/>
-            </a:pPr>
-            <a:endParaRPr lang="en-US" sz="2400" dirty="0"/>
-          </a:p>
-          <a:p>
-            <a:pPr marL="228600" indent="-228600">
-              <a:buFont typeface="Arial" panose="020B0604020202020204" pitchFamily="34" charset="0"/>
-              <a:buChar char="•"/>
-            </a:pPr>
-            <a:endParaRPr lang="en-US" sz="2400" dirty="0" smtClean="0"/>
-          </a:p>
-          <a:p>
-            <a:pPr marL="228600" indent="-228600">
-              <a:buFont typeface="Arial" panose="020B0604020202020204" pitchFamily="34" charset="0"/>
-              <a:buChar char="•"/>
-            </a:pPr>
-            <a:endParaRPr lang="en-US" sz="2400" dirty="0" smtClean="0"/>
-          </a:p>
-          <a:p>
-            <a:pPr marL="228600" indent="-228600">
-              <a:buFont typeface="Arial" panose="020B0604020202020204" pitchFamily="34" charset="0"/>
-              <a:buChar char="•"/>
-            </a:pPr>
-            <a:endParaRPr lang="en-US" sz="2600" dirty="0"/>
-          </a:p>
-          <a:p>
-            <a:pPr marL="228600" indent="-228600">
-              <a:buFont typeface="Arial" panose="020B0604020202020204" pitchFamily="34" charset="0"/>
-              <a:buChar char="•"/>
-            </a:pPr>
-            <a:endParaRPr lang="en-US" sz="2400" dirty="0" smtClean="0"/>
-          </a:p>
-          <a:p>
-            <a:pPr marL="685800" lvl="1" indent="-228600">
-              <a:buFont typeface="Arial" panose="020B0604020202020204" pitchFamily="34" charset="0"/>
-              <a:buChar char="•"/>
-            </a:pPr>
-            <a:endParaRPr lang="en-US" sz="2400" dirty="0"/>
-          </a:p>
-          <a:p>
-            <a:pPr marL="228600" indent="-228600">
-              <a:buFont typeface="Arial" panose="020B0604020202020204" pitchFamily="34" charset="0"/>
-              <a:buChar char="•"/>
-            </a:pPr>
-            <a:endParaRPr lang="en-US" dirty="0" smtClean="0"/>
-          </a:p>
-          <a:p>
-            <a:pPr marL="228600" indent="-228600">
-              <a:buFont typeface="Arial" panose="020B0604020202020204" pitchFamily="34" charset="0"/>
-              <a:buChar char="•"/>
-            </a:pPr>
-            <a:endParaRPr lang="en-US" dirty="0"/>
-          </a:p>
-        </p:txBody>
-      </p:sp>
-    </p:spTree>
-    <p:extLst>
-      <p:ext uri="{BB962C8B-B14F-4D97-AF65-F5344CB8AC3E}">
-        <p14:creationId xmlns:p14="http://schemas.microsoft.com/office/powerpoint/2010/main" val="2957346068"/>
-      </p:ext>
-    </p:extLst>
-  </p:cSld>
-  <p:clrMapOvr>
-    <a:masterClrMapping/>
-  </p:clrMapOvr>
-  <p:timing>
-    <p:tnLst>
-      <p:par>
-        <p:cTn id="1" dur="indefinite" restart="never" nodeType="tmRoot">
-          <p:childTnLst>
-            <p:seq concurrent="1" nextAc="seek">
-              <p:cTn id="2" dur="indefinite" nodeType="mainSeq">
-                <p:childTnLst>
-                  <p:par>
-                    <p:cTn id="3" fill="hold">
-                      <p:stCondLst>
-                        <p:cond delay="indefinite"/>
-                      </p:stCondLst>
-                      <p:childTnLst>
-                        <p:par>
-                          <p:cTn id="4" fill="hold">
-                            <p:stCondLst>
-                              <p:cond delay="0"/>
-                            </p:stCondLst>
-                            <p:childTnLst>
-                              <p:par>
-                                <p:cTn id="5" presetID="1" presetClass="entr" presetSubtype="0" fill="hold" nodeType="clickEffect">
-                                  <p:stCondLst>
-                                    <p:cond delay="0"/>
-                                  </p:stCondLst>
-                                  <p:childTnLst>
-                                    <p:set>
-                                      <p:cBhvr>
-                                        <p:cTn id="6" dur="1" fill="hold">
-                                          <p:stCondLst>
-                                            <p:cond delay="0"/>
-                                          </p:stCondLst>
-                                        </p:cTn>
-                                        <p:tgtEl>
-                                          <p:spTgt spid="3">
-                                            <p:txEl>
-                                              <p:pRg st="0" end="0"/>
-                                            </p:txEl>
-                                          </p:spTgt>
-                                        </p:tgtEl>
-                                        <p:attrNameLst>
-                                          <p:attrName>style.visibility</p:attrName>
-                                        </p:attrNameLst>
-                                      </p:cBhvr>
-                                      <p:to>
-                                        <p:strVal val="visible"/>
-                                      </p:to>
-                                    </p:set>
-                                  </p:childTnLst>
-                                </p:cTn>
-                              </p:par>
-                            </p:childTnLst>
-                          </p:cTn>
-                        </p:par>
-                      </p:childTnLst>
-                    </p:cTn>
-                  </p:par>
-                  <p:par>
-                    <p:cTn id="7" fill="hold">
-                      <p:stCondLst>
-                        <p:cond delay="indefinite"/>
-                      </p:stCondLst>
-                      <p:childTnLst>
-                        <p:par>
-                          <p:cTn id="8" fill="hold">
-                            <p:stCondLst>
-                              <p:cond delay="0"/>
-                            </p:stCondLst>
-                            <p:childTnLst>
-                              <p:par>
-                                <p:cTn id="9" presetID="1" presetClass="entr" presetSubtype="0" fill="hold" nodeType="clickEffect">
-                                  <p:stCondLst>
-                                    <p:cond delay="0"/>
-                                  </p:stCondLst>
-                                  <p:childTnLst>
-                                    <p:set>
-                                      <p:cBhvr>
-                                        <p:cTn id="10" dur="1" fill="hold">
-                                          <p:stCondLst>
-                                            <p:cond delay="0"/>
-                                          </p:stCondLst>
-                                        </p:cTn>
-                                        <p:tgtEl>
-                                          <p:spTgt spid="3">
-                                            <p:txEl>
-                                              <p:pRg st="1" end="1"/>
-                                            </p:txEl>
-                                          </p:spTgt>
-                                        </p:tgtEl>
-                                        <p:attrNameLst>
-                                          <p:attrName>style.visibility</p:attrName>
-                                        </p:attrNameLst>
-                                      </p:cBhvr>
-                                      <p:to>
-                                        <p:strVal val="visible"/>
-                                      </p:to>
-                                    </p:set>
-                                  </p:childTnLst>
-                                </p:cTn>
-                              </p:par>
-                            </p:childTnLst>
-                          </p:cTn>
-                        </p:par>
-                      </p:childTnLst>
-                    </p:cTn>
-                  </p:par>
-                  <p:par>
-                    <p:cTn id="11" fill="hold">
-                      <p:stCondLst>
-                        <p:cond delay="indefinite"/>
-                      </p:stCondLst>
-                      <p:childTnLst>
-                        <p:par>
-                          <p:cTn id="12" fill="hold">
-                            <p:stCondLst>
-                              <p:cond delay="0"/>
-                            </p:stCondLst>
-                            <p:childTnLst>
-                              <p:par>
-                                <p:cTn id="13" presetID="1" presetClass="entr" presetSubtype="0" fill="hold" nodeType="clickEffect">
-                                  <p:stCondLst>
-                                    <p:cond delay="0"/>
-                                  </p:stCondLst>
-                                  <p:childTnLst>
-                                    <p:set>
-                                      <p:cBhvr>
-                                        <p:cTn id="14" dur="1" fill="hold">
-                                          <p:stCondLst>
-                                            <p:cond delay="0"/>
-                                          </p:stCondLst>
-                                        </p:cTn>
-                                        <p:tgtEl>
-                                          <p:spTgt spid="3">
-                                            <p:txEl>
-                                              <p:pRg st="2" end="2"/>
-                                            </p:txEl>
-                                          </p:spTgt>
-                                        </p:tgtEl>
-                                        <p:attrNameLst>
-                                          <p:attrName>style.visibility</p:attrName>
-                                        </p:attrNameLst>
-                                      </p:cBhvr>
-                                      <p:to>
-                                        <p:strVal val="visible"/>
-                                      </p:to>
-                                    </p:set>
-                                  </p:childTnLst>
-                                </p:cTn>
-                              </p:par>
-                            </p:childTnLst>
-                          </p:cTn>
-                        </p:par>
-                      </p:childTnLst>
-                    </p:cTn>
-                  </p:par>
-                  <p:par>
-                    <p:cTn id="15" fill="hold">
-                      <p:stCondLst>
-                        <p:cond delay="indefinite"/>
-                      </p:stCondLst>
-                      <p:childTnLst>
-                        <p:par>
-                          <p:cTn id="16" fill="hold">
-                            <p:stCondLst>
-                              <p:cond delay="0"/>
-                            </p:stCondLst>
-                            <p:childTnLst>
-                              <p:par>
-                                <p:cTn id="17" presetID="1" presetClass="entr" presetSubtype="0" fill="hold" nodeType="clickEffect">
-                                  <p:stCondLst>
-                                    <p:cond delay="0"/>
-                                  </p:stCondLst>
-                                  <p:childTnLst>
-                                    <p:set>
-                                      <p:cBhvr>
-                                        <p:cTn id="18" dur="1" fill="hold">
-                                          <p:stCondLst>
-                                            <p:cond delay="0"/>
-                                          </p:stCondLst>
-                                        </p:cTn>
-                                        <p:tgtEl>
-                                          <p:spTgt spid="3">
-                                            <p:txEl>
-                                              <p:pRg st="3" end="3"/>
-                                            </p:txEl>
-                                          </p:spTgt>
-                                        </p:tgtEl>
-                                        <p:attrNameLst>
-                                          <p:attrName>style.visibility</p:attrName>
-                                        </p:attrNameLst>
-                                      </p:cBhvr>
-                                      <p:to>
-                                        <p:strVal val="visible"/>
-                                      </p:to>
-                                    </p:set>
-                                  </p:childTnLst>
-                                </p:cTn>
-                              </p:par>
-                            </p:childTnLst>
-                          </p:cTn>
-                        </p:par>
-                      </p:childTnLst>
-                    </p:cTn>
-                  </p:par>
-                </p:childTnLst>
-              </p:cTn>
-              <p:prevCondLst>
-                <p:cond evt="onPrev" delay="0">
-                  <p:tgtEl>
-                    <p:sldTgt/>
-                  </p:tgtEl>
-                </p:cond>
-              </p:prevCondLst>
-              <p:nextCondLst>
-                <p:cond evt="onNext" delay="0">
-                  <p:tgtEl>
-                    <p:sldTgt/>
-                  </p:tgtEl>
-                </p:cond>
-              </p:nextCondLst>
-            </p:seq>
-          </p:childTnLst>
-        </p:cTn>
-      </p:par>
-    </p:tnLst>
-  </p:timing>
-</p:sld>
-</file>
-
-<file path=ppt/slides/slide23.xml><?xml version="1.0" encoding="utf-8"?>
+<file path=ppt/slides/slide19.xml><?xml version="1.0" encoding="utf-8"?>
 <p:sld xmlns:a="http://schemas.openxmlformats.org/drawingml/2006/main" xmlns:r="http://schemas.openxmlformats.org/officeDocument/2006/relationships" xmlns:p="http://schemas.openxmlformats.org/presentationml/2006/main">
   <p:cSld>
     <p:spTree>
@@ -12994,6 +9900,608 @@
         </p:cTn>
       </p:par>
     </p:tnLst>
+  </p:timing>
+</p:sld>
+</file>
+
+<file path=ppt/slides/slide2.xml><?xml version="1.0" encoding="utf-8"?>
+<p:sld xmlns:a="http://schemas.openxmlformats.org/drawingml/2006/main" xmlns:r="http://schemas.openxmlformats.org/officeDocument/2006/relationships" xmlns:p="http://schemas.openxmlformats.org/presentationml/2006/main">
+  <p:cSld>
+    <p:spTree>
+      <p:nvGrpSpPr>
+        <p:cNvPr id="1" name=""/>
+        <p:cNvGrpSpPr/>
+        <p:nvPr/>
+      </p:nvGrpSpPr>
+      <p:grpSpPr>
+        <a:xfrm>
+          <a:off x="0" y="0"/>
+          <a:ext cx="0" cy="0"/>
+          <a:chOff x="0" y="0"/>
+          <a:chExt cx="0" cy="0"/>
+        </a:xfrm>
+      </p:grpSpPr>
+      <p:sp>
+        <p:nvSpPr>
+          <p:cNvPr id="2" name="Title 1"/>
+          <p:cNvSpPr>
+            <a:spLocks noGrp="1"/>
+          </p:cNvSpPr>
+          <p:nvPr>
+            <p:ph type="title"/>
+          </p:nvPr>
+        </p:nvSpPr>
+        <p:spPr/>
+        <p:txBody>
+          <a:bodyPr/>
+          <a:lstStyle/>
+          <a:p>
+            <a:r>
+              <a:rPr lang="en-US" dirty="0" smtClean="0">
+                <a:latin typeface="+mn-lt"/>
+              </a:rPr>
+              <a:t>Agenda</a:t>
+            </a:r>
+            <a:endParaRPr lang="en-US" dirty="0">
+              <a:latin typeface="+mn-lt"/>
+            </a:endParaRPr>
+          </a:p>
+        </p:txBody>
+      </p:sp>
+      <p:sp>
+        <p:nvSpPr>
+          <p:cNvPr id="3" name="Subtitle 2"/>
+          <p:cNvSpPr>
+            <a:spLocks noGrp="1"/>
+          </p:cNvSpPr>
+          <p:nvPr>
+            <p:ph type="subTitle" idx="1"/>
+          </p:nvPr>
+        </p:nvSpPr>
+        <p:spPr>
+          <a:xfrm>
+            <a:off x="573586" y="2011680"/>
+            <a:ext cx="9199063" cy="4060239"/>
+          </a:xfrm>
+        </p:spPr>
+        <p:txBody>
+          <a:bodyPr/>
+          <a:lstStyle/>
+          <a:p>
+            <a:pPr marL="228600" indent="-228600">
+              <a:buFont typeface="Arial" panose="020B0604020202020204" pitchFamily="34" charset="0"/>
+              <a:buChar char="•"/>
+            </a:pPr>
+            <a:r>
+              <a:rPr lang="en-US" sz="2400" dirty="0" smtClean="0"/>
+              <a:t>What is Software Testing</a:t>
+            </a:r>
+          </a:p>
+          <a:p>
+            <a:pPr marL="228600" indent="-228600">
+              <a:buFont typeface="Arial" panose="020B0604020202020204" pitchFamily="34" charset="0"/>
+              <a:buChar char="•"/>
+            </a:pPr>
+            <a:r>
+              <a:rPr lang="en-US" sz="2400" dirty="0" smtClean="0"/>
+              <a:t>White Box vs. Black Box  vs. Grey Box</a:t>
+            </a:r>
+          </a:p>
+          <a:p>
+            <a:pPr marL="228600" indent="-228600">
+              <a:buFont typeface="Arial" panose="020B0604020202020204" pitchFamily="34" charset="0"/>
+              <a:buChar char="•"/>
+            </a:pPr>
+            <a:r>
+              <a:rPr lang="en-US" sz="2400" dirty="0" smtClean="0"/>
+              <a:t>Manual vs. Automated Testing</a:t>
+            </a:r>
+          </a:p>
+          <a:p>
+            <a:pPr marL="228600" indent="-228600">
+              <a:buFont typeface="Arial" panose="020B0604020202020204" pitchFamily="34" charset="0"/>
+              <a:buChar char="•"/>
+            </a:pPr>
+            <a:r>
+              <a:rPr lang="en-US" sz="2400" dirty="0" smtClean="0"/>
+              <a:t>What is Unit Testing?</a:t>
+            </a:r>
+          </a:p>
+          <a:p>
+            <a:pPr marL="228600" indent="-228600">
+              <a:buFont typeface="Arial" panose="020B0604020202020204" pitchFamily="34" charset="0"/>
+              <a:buChar char="•"/>
+            </a:pPr>
+            <a:r>
+              <a:rPr lang="en-US" sz="2400" dirty="0" smtClean="0"/>
+              <a:t>Playing with </a:t>
+            </a:r>
+            <a:r>
+              <a:rPr lang="en-US" sz="2400" dirty="0" err="1" smtClean="0"/>
+              <a:t>NUnit</a:t>
+            </a:r>
+            <a:endParaRPr lang="en-US" sz="2400" dirty="0" smtClean="0"/>
+          </a:p>
+          <a:p>
+            <a:pPr marL="228600" indent="-228600">
+              <a:buFont typeface="Arial" panose="020B0604020202020204" pitchFamily="34" charset="0"/>
+              <a:buChar char="•"/>
+            </a:pPr>
+            <a:r>
+              <a:rPr lang="en-US" sz="2400" dirty="0" smtClean="0"/>
+              <a:t>Dependency Injection</a:t>
+            </a:r>
+          </a:p>
+          <a:p>
+            <a:pPr marL="228600" indent="-228600">
+              <a:buFont typeface="Arial" panose="020B0604020202020204" pitchFamily="34" charset="0"/>
+              <a:buChar char="•"/>
+            </a:pPr>
+            <a:r>
+              <a:rPr lang="en-US" sz="2400" dirty="0" smtClean="0"/>
+              <a:t>Role of Unit Testing in CI/CD</a:t>
+            </a:r>
+          </a:p>
+          <a:p>
+            <a:pPr marL="228600" indent="-228600">
+              <a:buFont typeface="Arial" panose="020B0604020202020204" pitchFamily="34" charset="0"/>
+              <a:buChar char="•"/>
+            </a:pPr>
+            <a:r>
+              <a:rPr lang="en-US" sz="2400" dirty="0" smtClean="0"/>
+              <a:t>What is next?</a:t>
+            </a:r>
+          </a:p>
+          <a:p>
+            <a:pPr marL="228600" indent="-228600">
+              <a:buFont typeface="Arial" panose="020B0604020202020204" pitchFamily="34" charset="0"/>
+              <a:buChar char="•"/>
+            </a:pPr>
+            <a:endParaRPr lang="en-US" dirty="0" smtClean="0"/>
+          </a:p>
+          <a:p>
+            <a:pPr marL="228600" indent="-228600">
+              <a:buFont typeface="Arial" panose="020B0604020202020204" pitchFamily="34" charset="0"/>
+              <a:buChar char="•"/>
+            </a:pPr>
+            <a:endParaRPr lang="en-US" dirty="0"/>
+          </a:p>
+        </p:txBody>
+      </p:sp>
+    </p:spTree>
+    <p:extLst>
+      <p:ext uri="{BB962C8B-B14F-4D97-AF65-F5344CB8AC3E}">
+        <p14:creationId xmlns:p14="http://schemas.microsoft.com/office/powerpoint/2010/main" val="3639720695"/>
+      </p:ext>
+    </p:extLst>
+  </p:cSld>
+  <p:clrMapOvr>
+    <a:masterClrMapping/>
+  </p:clrMapOvr>
+  <p:timing>
+    <p:tnLst>
+      <p:par>
+        <p:cTn id="1" dur="indefinite" restart="never" nodeType="tmRoot">
+          <p:childTnLst>
+            <p:seq concurrent="1" nextAc="seek">
+              <p:cTn id="2" dur="indefinite" nodeType="mainSeq">
+                <p:childTnLst>
+                  <p:par>
+                    <p:cTn id="3" fill="hold">
+                      <p:stCondLst>
+                        <p:cond delay="indefinite"/>
+                      </p:stCondLst>
+                      <p:childTnLst>
+                        <p:par>
+                          <p:cTn id="4" fill="hold">
+                            <p:stCondLst>
+                              <p:cond delay="0"/>
+                            </p:stCondLst>
+                            <p:childTnLst>
+                              <p:par>
+                                <p:cTn id="5" presetID="1" presetClass="entr" presetSubtype="0" fill="hold" grpId="0" nodeType="clickEffect">
+                                  <p:stCondLst>
+                                    <p:cond delay="0"/>
+                                  </p:stCondLst>
+                                  <p:childTnLst>
+                                    <p:set>
+                                      <p:cBhvr>
+                                        <p:cTn id="6" dur="1" fill="hold">
+                                          <p:stCondLst>
+                                            <p:cond delay="0"/>
+                                          </p:stCondLst>
+                                        </p:cTn>
+                                        <p:tgtEl>
+                                          <p:spTgt spid="3">
+                                            <p:txEl>
+                                              <p:pRg st="0" end="0"/>
+                                            </p:txEl>
+                                          </p:spTgt>
+                                        </p:tgtEl>
+                                        <p:attrNameLst>
+                                          <p:attrName>style.visibility</p:attrName>
+                                        </p:attrNameLst>
+                                      </p:cBhvr>
+                                      <p:to>
+                                        <p:strVal val="visible"/>
+                                      </p:to>
+                                    </p:set>
+                                  </p:childTnLst>
+                                </p:cTn>
+                              </p:par>
+                            </p:childTnLst>
+                          </p:cTn>
+                        </p:par>
+                      </p:childTnLst>
+                    </p:cTn>
+                  </p:par>
+                  <p:par>
+                    <p:cTn id="7" fill="hold">
+                      <p:stCondLst>
+                        <p:cond delay="indefinite"/>
+                      </p:stCondLst>
+                      <p:childTnLst>
+                        <p:par>
+                          <p:cTn id="8" fill="hold">
+                            <p:stCondLst>
+                              <p:cond delay="0"/>
+                            </p:stCondLst>
+                            <p:childTnLst>
+                              <p:par>
+                                <p:cTn id="9" presetID="1" presetClass="entr" presetSubtype="0" fill="hold" grpId="0" nodeType="clickEffect">
+                                  <p:stCondLst>
+                                    <p:cond delay="0"/>
+                                  </p:stCondLst>
+                                  <p:childTnLst>
+                                    <p:set>
+                                      <p:cBhvr>
+                                        <p:cTn id="10" dur="1" fill="hold">
+                                          <p:stCondLst>
+                                            <p:cond delay="0"/>
+                                          </p:stCondLst>
+                                        </p:cTn>
+                                        <p:tgtEl>
+                                          <p:spTgt spid="3">
+                                            <p:txEl>
+                                              <p:pRg st="1" end="1"/>
+                                            </p:txEl>
+                                          </p:spTgt>
+                                        </p:tgtEl>
+                                        <p:attrNameLst>
+                                          <p:attrName>style.visibility</p:attrName>
+                                        </p:attrNameLst>
+                                      </p:cBhvr>
+                                      <p:to>
+                                        <p:strVal val="visible"/>
+                                      </p:to>
+                                    </p:set>
+                                  </p:childTnLst>
+                                </p:cTn>
+                              </p:par>
+                            </p:childTnLst>
+                          </p:cTn>
+                        </p:par>
+                      </p:childTnLst>
+                    </p:cTn>
+                  </p:par>
+                  <p:par>
+                    <p:cTn id="11" fill="hold">
+                      <p:stCondLst>
+                        <p:cond delay="indefinite"/>
+                      </p:stCondLst>
+                      <p:childTnLst>
+                        <p:par>
+                          <p:cTn id="12" fill="hold">
+                            <p:stCondLst>
+                              <p:cond delay="0"/>
+                            </p:stCondLst>
+                            <p:childTnLst>
+                              <p:par>
+                                <p:cTn id="13" presetID="1" presetClass="entr" presetSubtype="0" fill="hold" grpId="0" nodeType="clickEffect">
+                                  <p:stCondLst>
+                                    <p:cond delay="0"/>
+                                  </p:stCondLst>
+                                  <p:childTnLst>
+                                    <p:set>
+                                      <p:cBhvr>
+                                        <p:cTn id="14" dur="1" fill="hold">
+                                          <p:stCondLst>
+                                            <p:cond delay="0"/>
+                                          </p:stCondLst>
+                                        </p:cTn>
+                                        <p:tgtEl>
+                                          <p:spTgt spid="3">
+                                            <p:txEl>
+                                              <p:pRg st="2" end="2"/>
+                                            </p:txEl>
+                                          </p:spTgt>
+                                        </p:tgtEl>
+                                        <p:attrNameLst>
+                                          <p:attrName>style.visibility</p:attrName>
+                                        </p:attrNameLst>
+                                      </p:cBhvr>
+                                      <p:to>
+                                        <p:strVal val="visible"/>
+                                      </p:to>
+                                    </p:set>
+                                  </p:childTnLst>
+                                </p:cTn>
+                              </p:par>
+                            </p:childTnLst>
+                          </p:cTn>
+                        </p:par>
+                      </p:childTnLst>
+                    </p:cTn>
+                  </p:par>
+                  <p:par>
+                    <p:cTn id="15" fill="hold">
+                      <p:stCondLst>
+                        <p:cond delay="indefinite"/>
+                      </p:stCondLst>
+                      <p:childTnLst>
+                        <p:par>
+                          <p:cTn id="16" fill="hold">
+                            <p:stCondLst>
+                              <p:cond delay="0"/>
+                            </p:stCondLst>
+                            <p:childTnLst>
+                              <p:par>
+                                <p:cTn id="17" presetID="1" presetClass="entr" presetSubtype="0" fill="hold" grpId="0" nodeType="clickEffect">
+                                  <p:stCondLst>
+                                    <p:cond delay="0"/>
+                                  </p:stCondLst>
+                                  <p:childTnLst>
+                                    <p:set>
+                                      <p:cBhvr>
+                                        <p:cTn id="18" dur="1" fill="hold">
+                                          <p:stCondLst>
+                                            <p:cond delay="0"/>
+                                          </p:stCondLst>
+                                        </p:cTn>
+                                        <p:tgtEl>
+                                          <p:spTgt spid="3">
+                                            <p:txEl>
+                                              <p:pRg st="3" end="3"/>
+                                            </p:txEl>
+                                          </p:spTgt>
+                                        </p:tgtEl>
+                                        <p:attrNameLst>
+                                          <p:attrName>style.visibility</p:attrName>
+                                        </p:attrNameLst>
+                                      </p:cBhvr>
+                                      <p:to>
+                                        <p:strVal val="visible"/>
+                                      </p:to>
+                                    </p:set>
+                                  </p:childTnLst>
+                                </p:cTn>
+                              </p:par>
+                            </p:childTnLst>
+                          </p:cTn>
+                        </p:par>
+                      </p:childTnLst>
+                    </p:cTn>
+                  </p:par>
+                  <p:par>
+                    <p:cTn id="19" fill="hold">
+                      <p:stCondLst>
+                        <p:cond delay="indefinite"/>
+                      </p:stCondLst>
+                      <p:childTnLst>
+                        <p:par>
+                          <p:cTn id="20" fill="hold">
+                            <p:stCondLst>
+                              <p:cond delay="0"/>
+                            </p:stCondLst>
+                            <p:childTnLst>
+                              <p:par>
+                                <p:cTn id="21" presetID="1" presetClass="entr" presetSubtype="0" fill="hold" grpId="0" nodeType="clickEffect">
+                                  <p:stCondLst>
+                                    <p:cond delay="0"/>
+                                  </p:stCondLst>
+                                  <p:childTnLst>
+                                    <p:set>
+                                      <p:cBhvr>
+                                        <p:cTn id="22" dur="1" fill="hold">
+                                          <p:stCondLst>
+                                            <p:cond delay="0"/>
+                                          </p:stCondLst>
+                                        </p:cTn>
+                                        <p:tgtEl>
+                                          <p:spTgt spid="3">
+                                            <p:txEl>
+                                              <p:pRg st="4" end="4"/>
+                                            </p:txEl>
+                                          </p:spTgt>
+                                        </p:tgtEl>
+                                        <p:attrNameLst>
+                                          <p:attrName>style.visibility</p:attrName>
+                                        </p:attrNameLst>
+                                      </p:cBhvr>
+                                      <p:to>
+                                        <p:strVal val="visible"/>
+                                      </p:to>
+                                    </p:set>
+                                  </p:childTnLst>
+                                </p:cTn>
+                              </p:par>
+                            </p:childTnLst>
+                          </p:cTn>
+                        </p:par>
+                      </p:childTnLst>
+                    </p:cTn>
+                  </p:par>
+                  <p:par>
+                    <p:cTn id="23" fill="hold">
+                      <p:stCondLst>
+                        <p:cond delay="indefinite"/>
+                      </p:stCondLst>
+                      <p:childTnLst>
+                        <p:par>
+                          <p:cTn id="24" fill="hold">
+                            <p:stCondLst>
+                              <p:cond delay="0"/>
+                            </p:stCondLst>
+                            <p:childTnLst>
+                              <p:par>
+                                <p:cTn id="25" presetID="1" presetClass="entr" presetSubtype="0" fill="hold" grpId="0" nodeType="clickEffect">
+                                  <p:stCondLst>
+                                    <p:cond delay="0"/>
+                                  </p:stCondLst>
+                                  <p:childTnLst>
+                                    <p:set>
+                                      <p:cBhvr>
+                                        <p:cTn id="26" dur="1" fill="hold">
+                                          <p:stCondLst>
+                                            <p:cond delay="0"/>
+                                          </p:stCondLst>
+                                        </p:cTn>
+                                        <p:tgtEl>
+                                          <p:spTgt spid="3">
+                                            <p:txEl>
+                                              <p:pRg st="5" end="5"/>
+                                            </p:txEl>
+                                          </p:spTgt>
+                                        </p:tgtEl>
+                                        <p:attrNameLst>
+                                          <p:attrName>style.visibility</p:attrName>
+                                        </p:attrNameLst>
+                                      </p:cBhvr>
+                                      <p:to>
+                                        <p:strVal val="visible"/>
+                                      </p:to>
+                                    </p:set>
+                                  </p:childTnLst>
+                                </p:cTn>
+                              </p:par>
+                            </p:childTnLst>
+                          </p:cTn>
+                        </p:par>
+                      </p:childTnLst>
+                    </p:cTn>
+                  </p:par>
+                  <p:par>
+                    <p:cTn id="27" fill="hold">
+                      <p:stCondLst>
+                        <p:cond delay="indefinite"/>
+                      </p:stCondLst>
+                      <p:childTnLst>
+                        <p:par>
+                          <p:cTn id="28" fill="hold">
+                            <p:stCondLst>
+                              <p:cond delay="0"/>
+                            </p:stCondLst>
+                            <p:childTnLst>
+                              <p:par>
+                                <p:cTn id="29" presetID="1" presetClass="entr" presetSubtype="0" fill="hold" grpId="0" nodeType="clickEffect">
+                                  <p:stCondLst>
+                                    <p:cond delay="0"/>
+                                  </p:stCondLst>
+                                  <p:childTnLst>
+                                    <p:set>
+                                      <p:cBhvr>
+                                        <p:cTn id="30" dur="1" fill="hold">
+                                          <p:stCondLst>
+                                            <p:cond delay="0"/>
+                                          </p:stCondLst>
+                                        </p:cTn>
+                                        <p:tgtEl>
+                                          <p:spTgt spid="3">
+                                            <p:txEl>
+                                              <p:pRg st="6" end="6"/>
+                                            </p:txEl>
+                                          </p:spTgt>
+                                        </p:tgtEl>
+                                        <p:attrNameLst>
+                                          <p:attrName>style.visibility</p:attrName>
+                                        </p:attrNameLst>
+                                      </p:cBhvr>
+                                      <p:to>
+                                        <p:strVal val="visible"/>
+                                      </p:to>
+                                    </p:set>
+                                  </p:childTnLst>
+                                </p:cTn>
+                              </p:par>
+                            </p:childTnLst>
+                          </p:cTn>
+                        </p:par>
+                      </p:childTnLst>
+                    </p:cTn>
+                  </p:par>
+                  <p:par>
+                    <p:cTn id="31" fill="hold">
+                      <p:stCondLst>
+                        <p:cond delay="indefinite"/>
+                      </p:stCondLst>
+                      <p:childTnLst>
+                        <p:par>
+                          <p:cTn id="32" fill="hold">
+                            <p:stCondLst>
+                              <p:cond delay="0"/>
+                            </p:stCondLst>
+                            <p:childTnLst>
+                              <p:par>
+                                <p:cTn id="33" presetID="1" presetClass="entr" presetSubtype="0" fill="hold" grpId="0" nodeType="clickEffect">
+                                  <p:stCondLst>
+                                    <p:cond delay="0"/>
+                                  </p:stCondLst>
+                                  <p:childTnLst>
+                                    <p:set>
+                                      <p:cBhvr>
+                                        <p:cTn id="34" dur="1" fill="hold">
+                                          <p:stCondLst>
+                                            <p:cond delay="0"/>
+                                          </p:stCondLst>
+                                        </p:cTn>
+                                        <p:tgtEl>
+                                          <p:spTgt spid="3">
+                                            <p:txEl>
+                                              <p:pRg st="7" end="7"/>
+                                            </p:txEl>
+                                          </p:spTgt>
+                                        </p:tgtEl>
+                                        <p:attrNameLst>
+                                          <p:attrName>style.visibility</p:attrName>
+                                        </p:attrNameLst>
+                                      </p:cBhvr>
+                                      <p:to>
+                                        <p:strVal val="visible"/>
+                                      </p:to>
+                                    </p:set>
+                                  </p:childTnLst>
+                                </p:cTn>
+                              </p:par>
+                            </p:childTnLst>
+                          </p:cTn>
+                        </p:par>
+                      </p:childTnLst>
+                    </p:cTn>
+                  </p:par>
+                </p:childTnLst>
+              </p:cTn>
+              <p:prevCondLst>
+                <p:cond evt="onPrev" delay="0">
+                  <p:tgtEl>
+                    <p:sldTgt/>
+                  </p:tgtEl>
+                </p:cond>
+              </p:prevCondLst>
+              <p:nextCondLst>
+                <p:cond evt="onNext" delay="0">
+                  <p:tgtEl>
+                    <p:sldTgt/>
+                  </p:tgtEl>
+                </p:cond>
+              </p:nextCondLst>
+            </p:seq>
+          </p:childTnLst>
+        </p:cTn>
+      </p:par>
+    </p:tnLst>
+    <p:bldLst>
+      <p:bldP spid="3" grpId="0" build="p"/>
+    </p:bldLst>
   </p:timing>
 </p:sld>
 </file>
@@ -16211,7 +13719,7 @@
   <a:extraClrSchemeLst/>
   <a:extLst>
     <a:ext uri="{05A4C25C-085E-4340-85A3-A5531E510DB2}">
-      <thm15:themeFamily xmlns="" xmlns:thm15="http://schemas.microsoft.com/office/thememl/2012/main" name="Office Theme" id="{62F939B6-93AF-4DB8-9C6B-D6C7DFDC589F}" vid="{4A3C46E8-61CC-4603-A589-7422A47A8E4A}"/>
+      <thm15:themeFamily xmlns:thm15="http://schemas.microsoft.com/office/thememl/2012/main" xmlns="" name="Office Theme" id="{62F939B6-93AF-4DB8-9C6B-D6C7DFDC589F}" vid="{4A3C46E8-61CC-4603-A589-7422A47A8E4A}"/>
     </a:ext>
   </a:extLst>
 </a:theme>

</xml_diff>